<commit_message>
Fix figures - add A/B to Thing Directories
The text refers to "Thing Directory A" and "Thing Directory B" but these were not labelled in the figure.  Fixed.
</commit_message>
<xml_diff>
--- a/images/arch-figures-matsukura-new.pptx
+++ b/images/arch-figures-matsukura-new.pptx
@@ -141,7 +141,7 @@
 
 <file path=ppt/commentAuthors.xml><?xml version="1.0" encoding="utf-8"?>
 <p:cmAuthorLst xmlns:a="http://schemas.openxmlformats.org/drawingml/2006/main" xmlns:r="http://schemas.openxmlformats.org/officeDocument/2006/relationships" xmlns:p="http://schemas.openxmlformats.org/presentationml/2006/main">
-  <p:cmAuthor id="3" name="作成者" initials="A" lastIdx="0" clrIdx="2"/>
+  <p:cmAuthor id="4" name="Author" initials="A" lastIdx="0" clrIdx="3"/>
 </p:cmAuthorLst>
 </file>
 
@@ -235,7 +235,7 @@
           <a:p>
             <a:fld id="{4F76F5E4-A90A-4660-9E2F-BE3206DD94E4}" type="datetimeFigureOut">
               <a:rPr kumimoji="1" lang="ja-JP" altLang="en-US" smtClean="0"/>
-              <a:t>2019/3/22</a:t>
+              <a:t>2019/3/25</a:t>
             </a:fld>
             <a:endParaRPr kumimoji="1" lang="ja-JP" altLang="en-US"/>
           </a:p>
@@ -677,7 +677,7 @@
           <a:p>
             <a:fld id="{292132E3-E025-46E2-B95D-8A9881BBBAC0}" type="datetime1">
               <a:rPr kumimoji="1" lang="ja-JP" altLang="en-US" smtClean="0"/>
-              <a:t>2019/3/22</a:t>
+              <a:t>2019/3/25</a:t>
             </a:fld>
             <a:endParaRPr kumimoji="1" lang="ja-JP" altLang="en-US"/>
           </a:p>
@@ -1072,7 +1072,7 @@
           <a:p>
             <a:fld id="{9995A5EA-0525-4AE7-8263-25F14627C622}" type="datetime1">
               <a:rPr kumimoji="1" lang="ja-JP" altLang="en-US" smtClean="0"/>
-              <a:t>2019/3/22</a:t>
+              <a:t>2019/3/25</a:t>
             </a:fld>
             <a:endParaRPr kumimoji="1" lang="ja-JP" altLang="en-US"/>
           </a:p>
@@ -1283,7 +1283,7 @@
           <a:p>
             <a:fld id="{21B873FF-70AB-4D71-A95B-922B7FF90D3B}" type="datetime1">
               <a:rPr kumimoji="1" lang="ja-JP" altLang="en-US" smtClean="0"/>
-              <a:t>2019/3/22</a:t>
+              <a:t>2019/3/25</a:t>
             </a:fld>
             <a:endParaRPr kumimoji="1" lang="ja-JP" altLang="en-US"/>
           </a:p>
@@ -1522,7 +1522,7 @@
           <a:p>
             <a:fld id="{A93F7EB4-8919-41E4-B4FB-AA1DEA51CBF0}" type="datetime1">
               <a:rPr kumimoji="1" lang="ja-JP" altLang="en-US" smtClean="0"/>
-              <a:t>2019/3/22</a:t>
+              <a:t>2019/3/25</a:t>
             </a:fld>
             <a:endParaRPr kumimoji="1" lang="ja-JP" altLang="en-US"/>
           </a:p>
@@ -1827,7 +1827,7 @@
           <a:p>
             <a:fld id="{DEDF76C0-E8A1-4776-BD11-BF60C2C6A528}" type="datetime1">
               <a:rPr kumimoji="1" lang="ja-JP" altLang="en-US" smtClean="0"/>
-              <a:t>2019/3/22</a:t>
+              <a:t>2019/3/25</a:t>
             </a:fld>
             <a:endParaRPr kumimoji="1" lang="ja-JP" altLang="en-US"/>
           </a:p>
@@ -2051,7 +2051,7 @@
           <a:p>
             <a:fld id="{6E5A0F01-E1BF-43AA-8B47-26F657B7E208}" type="datetime1">
               <a:rPr kumimoji="1" lang="ja-JP" altLang="en-US" smtClean="0"/>
-              <a:t>2019/3/22</a:t>
+              <a:t>2019/3/25</a:t>
             </a:fld>
             <a:endParaRPr kumimoji="1" lang="ja-JP" altLang="en-US"/>
           </a:p>
@@ -2471,7 +2471,7 @@
           <a:p>
             <a:fld id="{DE7FD16E-970E-4FD0-8190-13395C41C212}" type="datetime1">
               <a:rPr kumimoji="1" lang="ja-JP" altLang="en-US" smtClean="0"/>
-              <a:t>2019/3/22</a:t>
+              <a:t>2019/3/25</a:t>
             </a:fld>
             <a:endParaRPr kumimoji="1" lang="ja-JP" altLang="en-US"/>
           </a:p>
@@ -2771,7 +2771,7 @@
           <a:p>
             <a:fld id="{CDD65E9E-B1B8-4768-944E-0DC64EEB8E4D}" type="datetime1">
               <a:rPr kumimoji="1" lang="ja-JP" altLang="en-US" smtClean="0"/>
-              <a:t>2019/3/22</a:t>
+              <a:t>2019/3/25</a:t>
             </a:fld>
             <a:endParaRPr kumimoji="1" lang="ja-JP" altLang="en-US"/>
           </a:p>
@@ -2915,7 +2915,7 @@
           <a:p>
             <a:fld id="{276F12B2-36EF-475E-AA18-BB24F85EF65C}" type="datetime1">
               <a:rPr kumimoji="1" lang="ja-JP" altLang="en-US" smtClean="0"/>
-              <a:t>2019/3/22</a:t>
+              <a:t>2019/3/25</a:t>
             </a:fld>
             <a:endParaRPr kumimoji="1" lang="ja-JP" altLang="en-US"/>
           </a:p>
@@ -3196,7 +3196,7 @@
           <a:p>
             <a:fld id="{2C5D0117-7DED-45B4-8A07-7C32E7D132E1}" type="datetime1">
               <a:rPr kumimoji="1" lang="ja-JP" altLang="en-US" smtClean="0"/>
-              <a:t>2019/3/22</a:t>
+              <a:t>2019/3/25</a:t>
             </a:fld>
             <a:endParaRPr kumimoji="1" lang="ja-JP" altLang="en-US"/>
           </a:p>
@@ -3639,7 +3639,7 @@
           <a:p>
             <a:fld id="{4E551D39-2FD3-4DF5-9A39-DAAC994DB47B}" type="datetime1">
               <a:rPr kumimoji="1" lang="ja-JP" altLang="en-US" smtClean="0"/>
-              <a:t>2019/3/22</a:t>
+              <a:t>2019/3/25</a:t>
             </a:fld>
             <a:endParaRPr kumimoji="1" lang="ja-JP" altLang="en-US"/>
           </a:p>
@@ -4013,7 +4013,7 @@
           <a:p>
             <a:fld id="{17D7C59B-471B-422F-B057-3FD3B3200629}" type="datetime1">
               <a:rPr kumimoji="1" lang="ja-JP" altLang="en-US" smtClean="0"/>
-              <a:t>2019/3/22</a:t>
+              <a:t>2019/3/25</a:t>
             </a:fld>
             <a:endParaRPr kumimoji="1" lang="ja-JP" altLang="en-US"/>
           </a:p>
@@ -5023,12 +5023,8 @@
           <a:lstStyle/>
           <a:p>
             <a:r>
-              <a:rPr lang="en-US" altLang="ja-JP" dirty="0" smtClean="0"/>
-              <a:t>6.5 </a:t>
-            </a:r>
-            <a:r>
               <a:rPr lang="en-US" altLang="ja-JP" dirty="0"/>
-              <a:t>Inter connection of application and device</a:t>
+              <a:t>6.5 Inter connection of application and device</a:t>
             </a:r>
             <a:endParaRPr kumimoji="1" lang="ja-JP" altLang="en-US" dirty="0"/>
           </a:p>
@@ -5126,7 +5122,7 @@
               <a:defRPr/>
             </a:pPr>
             <a:r>
-              <a:rPr kumimoji="0" lang="en-US" altLang="ja-JP" sz="1400" b="1" i="0" u="none" strike="noStrike" kern="0" cap="none" spc="0" normalizeH="0" baseline="0" dirty="0" smtClean="0">
+              <a:rPr kumimoji="0" lang="en-US" altLang="ja-JP" sz="1400" b="1" i="0" u="none" strike="noStrike" kern="0" cap="none" spc="0" normalizeH="0" baseline="0" dirty="0">
                 <a:ln>
                   <a:noFill/>
                 </a:ln>
@@ -5142,20 +5138,6 @@
               </a:rPr>
               <a:t>Servient</a:t>
             </a:r>
-            <a:endParaRPr kumimoji="0" lang="en-US" altLang="ja-JP" sz="1400" b="1" i="0" u="none" strike="noStrike" kern="0" cap="none" spc="0" normalizeH="0" baseline="0" dirty="0">
-              <a:ln>
-                <a:noFill/>
-              </a:ln>
-              <a:solidFill>
-                <a:srgbClr val="000000"/>
-              </a:solidFill>
-              <a:effectLst/>
-              <a:uLnTx/>
-              <a:uFillTx/>
-              <a:latin typeface="Calibri" panose="020F0502020204030204" pitchFamily="34" charset="0"/>
-              <a:ea typeface="HG明朝E" panose="02020909000000000000" pitchFamily="17" charset="-128"/>
-              <a:cs typeface="Calibri" panose="020F0502020204030204" pitchFamily="34" charset="0"/>
-            </a:endParaRPr>
           </a:p>
         </p:txBody>
       </p:sp>
@@ -5213,7 +5195,7 @@
               <a:defRPr/>
             </a:pPr>
             <a:r>
-              <a:rPr lang="en-US" altLang="ja-JP" sz="1100" kern="0" dirty="0" err="1" smtClean="0">
+              <a:rPr lang="en-US" altLang="ja-JP" sz="1100" kern="0" dirty="0" err="1">
                 <a:solidFill>
                   <a:prstClr val="white"/>
                 </a:solidFill>
@@ -5288,7 +5270,7 @@
               <a:defRPr/>
             </a:pPr>
             <a:r>
-              <a:rPr lang="en-US" altLang="ja-JP" sz="1100" kern="0" dirty="0" err="1" smtClean="0">
+              <a:rPr lang="en-US" altLang="ja-JP" sz="1100" kern="0" dirty="0" err="1">
                 <a:solidFill>
                   <a:prstClr val="white"/>
                 </a:solidFill>
@@ -5426,17 +5408,6 @@
               <a:defRPr/>
             </a:pPr>
             <a:r>
-              <a:rPr kumimoji="0" lang="en-US" altLang="ja-JP" sz="1400" b="1" kern="0" dirty="0" smtClean="0">
-                <a:solidFill>
-                  <a:srgbClr val="000000"/>
-                </a:solidFill>
-                <a:latin typeface="Calibri" panose="020F0502020204030204" pitchFamily="34" charset="0"/>
-                <a:ea typeface="HG明朝E" panose="02020909000000000000" pitchFamily="17" charset="-128"/>
-                <a:cs typeface="Calibri" panose="020F0502020204030204" pitchFamily="34" charset="0"/>
-              </a:rPr>
-              <a:t>Serve</a:t>
-            </a:r>
-            <a:r>
               <a:rPr kumimoji="0" lang="en-US" altLang="ja-JP" sz="1400" b="1" kern="0" dirty="0">
                 <a:solidFill>
                   <a:srgbClr val="000000"/>
@@ -5445,16 +5416,8 @@
                 <a:ea typeface="HG明朝E" panose="02020909000000000000" pitchFamily="17" charset="-128"/>
                 <a:cs typeface="Calibri" panose="020F0502020204030204" pitchFamily="34" charset="0"/>
               </a:rPr>
-              <a:t>r</a:t>
-            </a:r>
-            <a:endParaRPr kumimoji="0" lang="en-US" altLang="ja-JP" sz="1400" b="1" kern="0" dirty="0">
-              <a:solidFill>
-                <a:srgbClr val="000000"/>
-              </a:solidFill>
-              <a:latin typeface="Calibri" panose="020F0502020204030204" pitchFamily="34" charset="0"/>
-              <a:ea typeface="HG明朝E" panose="02020909000000000000" pitchFamily="17" charset="-128"/>
-              <a:cs typeface="Calibri" panose="020F0502020204030204" pitchFamily="34" charset="0"/>
-            </a:endParaRPr>
+              <a:t>Server</a:t>
+            </a:r>
           </a:p>
         </p:txBody>
       </p:sp>
@@ -5574,7 +5537,7 @@
               <a:defRPr/>
             </a:pPr>
             <a:r>
-              <a:rPr kumimoji="0" lang="en-US" altLang="ja-JP" sz="1400" b="1" kern="0" dirty="0" smtClean="0">
+              <a:rPr kumimoji="0" lang="en-US" altLang="ja-JP" sz="1400" b="1" kern="0" dirty="0">
                 <a:solidFill>
                   <a:srgbClr val="000000"/>
                 </a:solidFill>
@@ -5655,7 +5618,7 @@
               <a:defRPr/>
             </a:pPr>
             <a:r>
-              <a:rPr lang="en-US" altLang="ja-JP" sz="1100" kern="0" dirty="0" err="1" smtClean="0">
+              <a:rPr lang="en-US" altLang="ja-JP" sz="1100" kern="0" dirty="0" err="1">
                 <a:solidFill>
                   <a:prstClr val="white"/>
                 </a:solidFill>
@@ -5730,7 +5693,7 @@
               <a:defRPr/>
             </a:pPr>
             <a:r>
-              <a:rPr lang="en-US" altLang="ja-JP" sz="1100" kern="0" dirty="0" err="1" smtClean="0">
+              <a:rPr lang="en-US" altLang="ja-JP" sz="1100" kern="0" dirty="0" err="1">
                 <a:solidFill>
                   <a:prstClr val="white"/>
                 </a:solidFill>
@@ -5868,7 +5831,7 @@
               <a:defRPr/>
             </a:pPr>
             <a:r>
-              <a:rPr kumimoji="0" lang="en-US" altLang="ja-JP" sz="1400" b="1" kern="0" dirty="0" smtClean="0">
+              <a:rPr kumimoji="0" lang="en-US" altLang="ja-JP" sz="1400" b="1" kern="0" dirty="0">
                 <a:solidFill>
                   <a:srgbClr val="000000"/>
                 </a:solidFill>
@@ -5964,7 +5927,7 @@
               <a:defRPr/>
             </a:pPr>
             <a:r>
-              <a:rPr kumimoji="0" lang="en-US" altLang="ja-JP" sz="1400" b="1" kern="0" dirty="0" smtClean="0">
+              <a:rPr kumimoji="0" lang="en-US" altLang="ja-JP" sz="1400" b="1" kern="0" dirty="0">
                 <a:solidFill>
                   <a:srgbClr val="000000"/>
                 </a:solidFill>
@@ -6045,7 +6008,7 @@
               <a:defRPr/>
             </a:pPr>
             <a:r>
-              <a:rPr lang="en-US" altLang="ja-JP" sz="1100" kern="0" dirty="0" err="1" smtClean="0">
+              <a:rPr lang="en-US" altLang="ja-JP" sz="1100" kern="0" dirty="0" err="1">
                 <a:solidFill>
                   <a:prstClr val="white"/>
                 </a:solidFill>
@@ -6120,7 +6083,7 @@
               <a:defRPr/>
             </a:pPr>
             <a:r>
-              <a:rPr lang="en-US" altLang="ja-JP" sz="1100" kern="0" dirty="0" err="1" smtClean="0">
+              <a:rPr lang="en-US" altLang="ja-JP" sz="1100" kern="0" dirty="0" err="1">
                 <a:solidFill>
                   <a:prstClr val="white"/>
                 </a:solidFill>
@@ -6407,7 +6370,7 @@
               <a:defRPr/>
             </a:pPr>
             <a:r>
-              <a:rPr kumimoji="0" lang="en-US" altLang="ja-JP" sz="1400" b="1" kern="0" dirty="0" smtClean="0">
+              <a:rPr kumimoji="0" lang="en-US" altLang="ja-JP" sz="1400" b="1" kern="0" dirty="0">
                 <a:solidFill>
                   <a:srgbClr val="000000"/>
                 </a:solidFill>
@@ -6418,7 +6381,7 @@
               <a:t>Client </a:t>
             </a:r>
             <a:r>
-              <a:rPr kumimoji="0" lang="en-US" altLang="ja-JP" sz="1400" b="1" i="0" u="none" strike="noStrike" kern="0" cap="none" spc="0" normalizeH="0" baseline="0" dirty="0" smtClean="0">
+              <a:rPr kumimoji="0" lang="en-US" altLang="ja-JP" sz="1400" b="1" i="0" u="none" strike="noStrike" kern="0" cap="none" spc="0" normalizeH="0" baseline="0" dirty="0">
                 <a:ln>
                   <a:noFill/>
                 </a:ln>
@@ -6434,20 +6397,6 @@
               </a:rPr>
               <a:t>2</a:t>
             </a:r>
-            <a:endParaRPr kumimoji="0" lang="en-US" altLang="ja-JP" sz="1400" b="1" i="0" u="none" strike="noStrike" kern="0" cap="none" spc="0" normalizeH="0" baseline="0" dirty="0">
-              <a:ln>
-                <a:noFill/>
-              </a:ln>
-              <a:solidFill>
-                <a:srgbClr val="000000"/>
-              </a:solidFill>
-              <a:effectLst/>
-              <a:uLnTx/>
-              <a:uFillTx/>
-              <a:latin typeface="Calibri" panose="020F0502020204030204" pitchFamily="34" charset="0"/>
-              <a:ea typeface="HG明朝E" panose="02020909000000000000" pitchFamily="17" charset="-128"/>
-              <a:cs typeface="Calibri" panose="020F0502020204030204" pitchFamily="34" charset="0"/>
-            </a:endParaRPr>
           </a:p>
         </p:txBody>
       </p:sp>
@@ -6505,7 +6454,7 @@
               <a:defRPr/>
             </a:pPr>
             <a:r>
-              <a:rPr lang="en-US" altLang="ja-JP" sz="1100" kern="0" dirty="0" err="1" smtClean="0">
+              <a:rPr lang="en-US" altLang="ja-JP" sz="1100" kern="0" dirty="0" err="1">
                 <a:solidFill>
                   <a:prstClr val="white"/>
                 </a:solidFill>
@@ -6595,7 +6544,7 @@
               <a:defRPr/>
             </a:pPr>
             <a:r>
-              <a:rPr kumimoji="0" lang="en-US" altLang="ja-JP" sz="1400" b="1" kern="0" dirty="0" smtClean="0">
+              <a:rPr kumimoji="0" lang="en-US" altLang="ja-JP" sz="1400" b="1" kern="0" dirty="0">
                 <a:solidFill>
                   <a:srgbClr val="000000"/>
                 </a:solidFill>
@@ -6605,14 +6554,6 @@
               </a:rPr>
               <a:t>Remote</a:t>
             </a:r>
-            <a:endParaRPr kumimoji="0" lang="en-US" altLang="ja-JP" sz="1400" b="1" kern="0" dirty="0">
-              <a:solidFill>
-                <a:srgbClr val="000000"/>
-              </a:solidFill>
-              <a:latin typeface="Calibri" panose="020F0502020204030204" pitchFamily="34" charset="0"/>
-              <a:ea typeface="HG明朝E" panose="02020909000000000000" pitchFamily="17" charset="-128"/>
-              <a:cs typeface="Calibri" panose="020F0502020204030204" pitchFamily="34" charset="0"/>
-            </a:endParaRPr>
           </a:p>
           <a:p>
             <a:pPr marL="0" marR="0" lvl="0" indent="0" algn="ctr" defTabSz="914400" eaLnBrk="1" fontAlgn="ctr" latinLnBrk="0" hangingPunct="1">
@@ -6706,7 +6647,7 @@
               <a:defRPr/>
             </a:pPr>
             <a:r>
-              <a:rPr lang="en-US" altLang="ja-JP" sz="1100" kern="0" dirty="0" err="1" smtClean="0">
+              <a:rPr lang="en-US" altLang="ja-JP" sz="1100" kern="0" dirty="0" err="1">
                 <a:solidFill>
                   <a:prstClr val="white"/>
                 </a:solidFill>
@@ -6781,7 +6722,7 @@
               <a:defRPr/>
             </a:pPr>
             <a:r>
-              <a:rPr lang="en-US" altLang="ja-JP" sz="1100" kern="0" dirty="0" err="1" smtClean="0">
+              <a:rPr lang="en-US" altLang="ja-JP" sz="1100" kern="0" dirty="0" err="1">
                 <a:solidFill>
                   <a:prstClr val="white"/>
                 </a:solidFill>
@@ -7014,7 +6955,7 @@
               <a:defRPr/>
             </a:pPr>
             <a:r>
-              <a:rPr kumimoji="0" lang="en-US" altLang="ja-JP" sz="1400" b="1" kern="0" dirty="0" smtClean="0">
+              <a:rPr kumimoji="0" lang="en-US" altLang="ja-JP" sz="1400" b="1" kern="0" dirty="0">
                 <a:solidFill>
                   <a:srgbClr val="000000"/>
                 </a:solidFill>
@@ -7044,7 +6985,7 @@
               <a:defRPr/>
             </a:pPr>
             <a:r>
-              <a:rPr kumimoji="0" lang="en-US" altLang="ja-JP" sz="1400" b="1" kern="0" dirty="0" smtClean="0">
+              <a:rPr kumimoji="0" lang="en-US" altLang="ja-JP" sz="1400" b="1" kern="0" dirty="0">
                 <a:solidFill>
                   <a:srgbClr val="000000"/>
                 </a:solidFill>
@@ -7055,7 +6996,7 @@
               <a:t>S</a:t>
             </a:r>
             <a:r>
-              <a:rPr kumimoji="0" lang="en-US" altLang="ja-JP" sz="1400" b="1" i="0" u="none" strike="noStrike" kern="0" cap="none" spc="0" normalizeH="0" baseline="0" dirty="0" smtClean="0">
+              <a:rPr kumimoji="0" lang="en-US" altLang="ja-JP" sz="1400" b="1" i="0" u="none" strike="noStrike" kern="0" cap="none" spc="0" normalizeH="0" baseline="0" dirty="0">
                 <a:ln>
                   <a:noFill/>
                 </a:ln>
@@ -7071,20 +7012,6 @@
               </a:rPr>
               <a:t>ervient</a:t>
             </a:r>
-            <a:endParaRPr kumimoji="0" lang="en-US" altLang="ja-JP" sz="1400" b="1" i="0" u="none" strike="noStrike" kern="0" cap="none" spc="0" normalizeH="0" baseline="0" dirty="0">
-              <a:ln>
-                <a:noFill/>
-              </a:ln>
-              <a:solidFill>
-                <a:srgbClr val="000000"/>
-              </a:solidFill>
-              <a:effectLst/>
-              <a:uLnTx/>
-              <a:uFillTx/>
-              <a:latin typeface="Calibri" panose="020F0502020204030204" pitchFamily="34" charset="0"/>
-              <a:ea typeface="HG明朝E" panose="02020909000000000000" pitchFamily="17" charset="-128"/>
-              <a:cs typeface="Calibri" panose="020F0502020204030204" pitchFamily="34" charset="0"/>
-            </a:endParaRPr>
           </a:p>
         </p:txBody>
       </p:sp>
@@ -7358,7 +7285,7 @@
               <a:defRPr/>
             </a:pPr>
             <a:r>
-              <a:rPr kumimoji="0" lang="en-US" altLang="ja-JP" sz="1400" b="1" kern="0" dirty="0" smtClean="0">
+              <a:rPr kumimoji="0" lang="en-US" altLang="ja-JP" sz="1400" b="1" kern="0" dirty="0">
                 <a:solidFill>
                   <a:srgbClr val="000000"/>
                 </a:solidFill>
@@ -7369,7 +7296,7 @@
               <a:t>Server </a:t>
             </a:r>
             <a:r>
-              <a:rPr kumimoji="0" lang="en-US" altLang="ja-JP" sz="1400" b="1" i="0" u="none" strike="noStrike" kern="0" cap="none" spc="0" normalizeH="0" baseline="0" dirty="0" smtClean="0">
+              <a:rPr kumimoji="0" lang="en-US" altLang="ja-JP" sz="1400" b="1" i="0" u="none" strike="noStrike" kern="0" cap="none" spc="0" normalizeH="0" baseline="0" dirty="0">
                 <a:ln>
                   <a:noFill/>
                 </a:ln>
@@ -7385,20 +7312,6 @@
               </a:rPr>
               <a:t>A</a:t>
             </a:r>
-            <a:endParaRPr kumimoji="0" lang="en-US" altLang="ja-JP" sz="1400" b="1" i="0" u="none" strike="noStrike" kern="0" cap="none" spc="0" normalizeH="0" baseline="0" dirty="0">
-              <a:ln>
-                <a:noFill/>
-              </a:ln>
-              <a:solidFill>
-                <a:srgbClr val="000000"/>
-              </a:solidFill>
-              <a:effectLst/>
-              <a:uLnTx/>
-              <a:uFillTx/>
-              <a:latin typeface="Calibri" panose="020F0502020204030204" pitchFamily="34" charset="0"/>
-              <a:ea typeface="HG明朝E" panose="02020909000000000000" pitchFamily="17" charset="-128"/>
-              <a:cs typeface="Calibri" panose="020F0502020204030204" pitchFamily="34" charset="0"/>
-            </a:endParaRPr>
           </a:p>
         </p:txBody>
       </p:sp>
@@ -7471,7 +7384,7 @@
               <a:defRPr/>
             </a:pPr>
             <a:r>
-              <a:rPr kumimoji="0" lang="en-US" altLang="ja-JP" sz="1400" b="1" kern="0" dirty="0" smtClean="0">
+              <a:rPr kumimoji="0" lang="en-US" altLang="ja-JP" sz="1400" b="1" kern="0" dirty="0">
                 <a:solidFill>
                   <a:srgbClr val="000000"/>
                 </a:solidFill>
@@ -7567,7 +7480,7 @@
               <a:defRPr/>
             </a:pPr>
             <a:r>
-              <a:rPr kumimoji="0" lang="en-US" altLang="ja-JP" sz="1400" b="1" kern="0" dirty="0" smtClean="0">
+              <a:rPr kumimoji="0" lang="en-US" altLang="ja-JP" sz="1400" b="1" kern="0" dirty="0">
                 <a:solidFill>
                   <a:srgbClr val="000000"/>
                 </a:solidFill>
@@ -7941,7 +7854,7 @@
               <a:defRPr/>
             </a:pPr>
             <a:r>
-              <a:rPr kumimoji="0" lang="en-US" altLang="ja-JP" sz="1400" b="1" kern="0" dirty="0" smtClean="0">
+              <a:rPr kumimoji="0" lang="en-US" altLang="ja-JP" sz="1400" b="1" kern="0" dirty="0">
                 <a:solidFill>
                   <a:srgbClr val="000000"/>
                 </a:solidFill>
@@ -7952,7 +7865,7 @@
               <a:t>Client</a:t>
             </a:r>
             <a:r>
-              <a:rPr kumimoji="0" lang="en-US" altLang="ja-JP" sz="1400" b="1" i="0" u="none" strike="noStrike" kern="0" cap="none" spc="0" normalizeH="0" baseline="0" dirty="0" smtClean="0">
+              <a:rPr kumimoji="0" lang="en-US" altLang="ja-JP" sz="1400" b="1" i="0" u="none" strike="noStrike" kern="0" cap="none" spc="0" normalizeH="0" baseline="0" dirty="0">
                 <a:ln>
                   <a:noFill/>
                 </a:ln>
@@ -7966,39 +7879,8 @@
                 <a:ea typeface="HG明朝E" panose="02020909000000000000" pitchFamily="17" charset="-128"/>
                 <a:cs typeface="Calibri" panose="020F0502020204030204" pitchFamily="34" charset="0"/>
               </a:rPr>
-              <a:t> </a:t>
-            </a:r>
-            <a:r>
-              <a:rPr kumimoji="0" lang="en-US" altLang="ja-JP" sz="1400" b="1" i="0" u="none" strike="noStrike" kern="0" cap="none" spc="0" normalizeH="0" baseline="0" dirty="0" smtClean="0">
-                <a:ln>
-                  <a:noFill/>
-                </a:ln>
-                <a:solidFill>
-                  <a:srgbClr val="000000"/>
-                </a:solidFill>
-                <a:effectLst/>
-                <a:uLnTx/>
-                <a:uFillTx/>
-                <a:latin typeface="Calibri" panose="020F0502020204030204" pitchFamily="34" charset="0"/>
-                <a:ea typeface="HG明朝E" panose="02020909000000000000" pitchFamily="17" charset="-128"/>
-                <a:cs typeface="Calibri" panose="020F0502020204030204" pitchFamily="34" charset="0"/>
-              </a:rPr>
-              <a:t>1</a:t>
-            </a:r>
-            <a:endParaRPr kumimoji="0" lang="en-US" altLang="ja-JP" sz="1400" b="1" i="0" u="none" strike="noStrike" kern="0" cap="none" spc="0" normalizeH="0" baseline="0" dirty="0">
-              <a:ln>
-                <a:noFill/>
-              </a:ln>
-              <a:solidFill>
-                <a:srgbClr val="000000"/>
-              </a:solidFill>
-              <a:effectLst/>
-              <a:uLnTx/>
-              <a:uFillTx/>
-              <a:latin typeface="Calibri" panose="020F0502020204030204" pitchFamily="34" charset="0"/>
-              <a:ea typeface="HG明朝E" panose="02020909000000000000" pitchFamily="17" charset="-128"/>
-              <a:cs typeface="Calibri" panose="020F0502020204030204" pitchFamily="34" charset="0"/>
-            </a:endParaRPr>
+              <a:t> 1</a:t>
+            </a:r>
           </a:p>
         </p:txBody>
       </p:sp>
@@ -8056,7 +7938,7 @@
               <a:defRPr/>
             </a:pPr>
             <a:r>
-              <a:rPr lang="en-US" altLang="ja-JP" sz="1100" kern="0" dirty="0" err="1" smtClean="0">
+              <a:rPr lang="en-US" altLang="ja-JP" sz="1100" kern="0" dirty="0" err="1">
                 <a:solidFill>
                   <a:prstClr val="white"/>
                 </a:solidFill>
@@ -8131,7 +8013,7 @@
               <a:defRPr/>
             </a:pPr>
             <a:r>
-              <a:rPr lang="en-US" altLang="ja-JP" sz="1100" kern="0" dirty="0" err="1" smtClean="0">
+              <a:rPr lang="en-US" altLang="ja-JP" sz="1100" kern="0" dirty="0" err="1">
                 <a:solidFill>
                   <a:prstClr val="white"/>
                 </a:solidFill>
@@ -8206,7 +8088,7 @@
               <a:defRPr/>
             </a:pPr>
             <a:r>
-              <a:rPr lang="en-US" altLang="ja-JP" sz="1100" kern="0" dirty="0" err="1" smtClean="0">
+              <a:rPr lang="en-US" altLang="ja-JP" sz="1100" kern="0" dirty="0" err="1">
                 <a:solidFill>
                   <a:prstClr val="white"/>
                 </a:solidFill>
@@ -8281,7 +8163,7 @@
               <a:defRPr/>
             </a:pPr>
             <a:r>
-              <a:rPr lang="en-US" altLang="ja-JP" sz="1100" kern="0" dirty="0" err="1" smtClean="0">
+              <a:rPr lang="en-US" altLang="ja-JP" sz="1100" kern="0" dirty="0" err="1">
                 <a:solidFill>
                   <a:prstClr val="white"/>
                 </a:solidFill>
@@ -8356,7 +8238,7 @@
               <a:defRPr/>
             </a:pPr>
             <a:r>
-              <a:rPr lang="en-US" altLang="ja-JP" sz="1100" kern="0" dirty="0" err="1" smtClean="0">
+              <a:rPr lang="en-US" altLang="ja-JP" sz="1100" kern="0" dirty="0" err="1">
                 <a:solidFill>
                   <a:prstClr val="white"/>
                 </a:solidFill>
@@ -8731,7 +8613,7 @@
               <a:defRPr/>
             </a:pPr>
             <a:r>
-              <a:rPr kumimoji="0" lang="en-US" altLang="ja-JP" sz="1400" b="1" kern="0" dirty="0" smtClean="0">
+              <a:rPr kumimoji="0" lang="en-US" altLang="ja-JP" sz="1400" b="1" kern="0" dirty="0">
                 <a:solidFill>
                   <a:srgbClr val="000000"/>
                 </a:solidFill>
@@ -8741,14 +8623,6 @@
               </a:rPr>
               <a:t>Thing Directory</a:t>
             </a:r>
-            <a:endParaRPr kumimoji="0" lang="en-US" altLang="ja-JP" sz="1400" b="1" kern="0" dirty="0">
-              <a:solidFill>
-                <a:srgbClr val="000000"/>
-              </a:solidFill>
-              <a:latin typeface="Calibri" panose="020F0502020204030204" pitchFamily="34" charset="0"/>
-              <a:ea typeface="HG明朝E" panose="02020909000000000000" pitchFamily="17" charset="-128"/>
-              <a:cs typeface="Calibri" panose="020F0502020204030204" pitchFamily="34" charset="0"/>
-            </a:endParaRPr>
           </a:p>
         </p:txBody>
       </p:sp>
@@ -8821,7 +8695,7 @@
               <a:defRPr/>
             </a:pPr>
             <a:r>
-              <a:rPr kumimoji="0" lang="en-US" altLang="ja-JP" sz="1400" b="1" kern="0" dirty="0" smtClean="0">
+              <a:rPr kumimoji="0" lang="en-US" altLang="ja-JP" sz="1400" b="1" kern="0" dirty="0">
                 <a:solidFill>
                   <a:srgbClr val="000000"/>
                 </a:solidFill>
@@ -8851,7 +8725,7 @@
               <a:defRPr/>
             </a:pPr>
             <a:r>
-              <a:rPr kumimoji="0" lang="en-US" altLang="ja-JP" sz="1400" b="1" kern="0" dirty="0" smtClean="0">
+              <a:rPr kumimoji="0" lang="en-US" altLang="ja-JP" sz="1400" b="1" kern="0" dirty="0">
                 <a:solidFill>
                   <a:srgbClr val="000000"/>
                 </a:solidFill>
@@ -8862,7 +8736,7 @@
               <a:t>S</a:t>
             </a:r>
             <a:r>
-              <a:rPr kumimoji="0" lang="en-US" altLang="ja-JP" sz="1400" b="1" i="0" u="none" strike="noStrike" kern="0" cap="none" spc="0" normalizeH="0" baseline="0" dirty="0" smtClean="0">
+              <a:rPr kumimoji="0" lang="en-US" altLang="ja-JP" sz="1400" b="1" i="0" u="none" strike="noStrike" kern="0" cap="none" spc="0" normalizeH="0" baseline="0" dirty="0">
                 <a:ln>
                   <a:noFill/>
                 </a:ln>
@@ -8878,20 +8752,6 @@
               </a:rPr>
               <a:t>ervient</a:t>
             </a:r>
-            <a:endParaRPr kumimoji="0" lang="en-US" altLang="ja-JP" sz="1400" b="1" i="0" u="none" strike="noStrike" kern="0" cap="none" spc="0" normalizeH="0" baseline="0" dirty="0">
-              <a:ln>
-                <a:noFill/>
-              </a:ln>
-              <a:solidFill>
-                <a:srgbClr val="000000"/>
-              </a:solidFill>
-              <a:effectLst/>
-              <a:uLnTx/>
-              <a:uFillTx/>
-              <a:latin typeface="Calibri" panose="020F0502020204030204" pitchFamily="34" charset="0"/>
-              <a:ea typeface="HG明朝E" panose="02020909000000000000" pitchFamily="17" charset="-128"/>
-              <a:cs typeface="Calibri" panose="020F0502020204030204" pitchFamily="34" charset="0"/>
-            </a:endParaRPr>
           </a:p>
         </p:txBody>
       </p:sp>
@@ -8949,7 +8809,7 @@
               <a:defRPr/>
             </a:pPr>
             <a:r>
-              <a:rPr lang="en-US" altLang="ja-JP" sz="1100" kern="0" dirty="0" err="1" smtClean="0">
+              <a:rPr lang="en-US" altLang="ja-JP" sz="1100" kern="0" dirty="0" err="1">
                 <a:solidFill>
                   <a:prstClr val="white"/>
                 </a:solidFill>
@@ -9024,7 +8884,7 @@
               <a:defRPr/>
             </a:pPr>
             <a:r>
-              <a:rPr lang="en-US" altLang="ja-JP" sz="1100" kern="0" dirty="0" err="1" smtClean="0">
+              <a:rPr lang="en-US" altLang="ja-JP" sz="1100" kern="0" dirty="0" err="1">
                 <a:solidFill>
                   <a:prstClr val="white"/>
                 </a:solidFill>
@@ -9209,7 +9069,7 @@
               <a:defRPr/>
             </a:pPr>
             <a:r>
-              <a:rPr kumimoji="0" lang="en-US" altLang="ja-JP" sz="1400" b="1" kern="0" dirty="0" smtClean="0">
+              <a:rPr kumimoji="0" lang="en-US" altLang="ja-JP" sz="1400" b="1" kern="0" dirty="0">
                 <a:solidFill>
                   <a:srgbClr val="000000"/>
                 </a:solidFill>
@@ -9219,14 +9079,6 @@
               </a:rPr>
               <a:t>Local</a:t>
             </a:r>
-            <a:endParaRPr kumimoji="0" lang="en-US" altLang="ja-JP" sz="1400" b="1" kern="0" dirty="0">
-              <a:solidFill>
-                <a:srgbClr val="000000"/>
-              </a:solidFill>
-              <a:latin typeface="Calibri" panose="020F0502020204030204" pitchFamily="34" charset="0"/>
-              <a:ea typeface="HG明朝E" panose="02020909000000000000" pitchFamily="17" charset="-128"/>
-              <a:cs typeface="Calibri" panose="020F0502020204030204" pitchFamily="34" charset="0"/>
-            </a:endParaRPr>
           </a:p>
           <a:p>
             <a:pPr marL="0" marR="0" lvl="0" indent="0" algn="ctr" defTabSz="914400" eaLnBrk="1" fontAlgn="ctr" latinLnBrk="0" hangingPunct="1">
@@ -9335,7 +9187,7 @@
               <a:defRPr/>
             </a:pPr>
             <a:r>
-              <a:rPr kumimoji="0" lang="en-US" altLang="ja-JP" sz="1400" b="1" kern="0" dirty="0" smtClean="0">
+              <a:rPr kumimoji="0" lang="en-US" altLang="ja-JP" sz="1400" b="1" kern="0" dirty="0">
                 <a:solidFill>
                   <a:srgbClr val="000000"/>
                 </a:solidFill>
@@ -9479,7 +9331,7 @@
               <a:defRPr/>
             </a:pPr>
             <a:r>
-              <a:rPr kumimoji="0" lang="en-US" altLang="ja-JP" sz="1400" b="1" kern="0" dirty="0" smtClean="0">
+              <a:rPr kumimoji="0" lang="en-US" altLang="ja-JP" sz="1400" b="1" kern="0" dirty="0">
                 <a:solidFill>
                   <a:srgbClr val="000000"/>
                 </a:solidFill>
@@ -9560,7 +9412,7 @@
               <a:defRPr/>
             </a:pPr>
             <a:r>
-              <a:rPr lang="en-US" altLang="ja-JP" sz="1100" kern="0" dirty="0" err="1" smtClean="0">
+              <a:rPr lang="en-US" altLang="ja-JP" sz="1100" kern="0" dirty="0" err="1">
                 <a:solidFill>
                   <a:prstClr val="white"/>
                 </a:solidFill>
@@ -9635,7 +9487,7 @@
               <a:defRPr/>
             </a:pPr>
             <a:r>
-              <a:rPr lang="en-US" altLang="ja-JP" sz="1100" kern="0" dirty="0" err="1" smtClean="0">
+              <a:rPr lang="en-US" altLang="ja-JP" sz="1100" kern="0" dirty="0" err="1">
                 <a:solidFill>
                   <a:prstClr val="white"/>
                 </a:solidFill>
@@ -9710,7 +9562,7 @@
               <a:defRPr/>
             </a:pPr>
             <a:r>
-              <a:rPr lang="en-US" altLang="ja-JP" sz="1100" kern="0" dirty="0" err="1" smtClean="0">
+              <a:rPr lang="en-US" altLang="ja-JP" sz="1100" kern="0" dirty="0" err="1">
                 <a:solidFill>
                   <a:prstClr val="white"/>
                 </a:solidFill>
@@ -9785,7 +9637,7 @@
               <a:defRPr/>
             </a:pPr>
             <a:r>
-              <a:rPr lang="en-US" altLang="ja-JP" sz="1100" kern="0" dirty="0" err="1" smtClean="0">
+              <a:rPr lang="en-US" altLang="ja-JP" sz="1100" kern="0" dirty="0" err="1">
                 <a:solidFill>
                   <a:prstClr val="white"/>
                 </a:solidFill>
@@ -10210,8 +10062,8 @@
         </p:nvSpPr>
         <p:spPr bwMode="auto">
           <a:xfrm>
-            <a:off x="2915817" y="1772816"/>
-            <a:ext cx="1218012" cy="547242"/>
+            <a:off x="2710355" y="1772816"/>
+            <a:ext cx="1423474" cy="547242"/>
           </a:xfrm>
           <a:prstGeom prst="roundRect">
             <a:avLst>
@@ -10265,7 +10117,7 @@
               <a:defRPr/>
             </a:pPr>
             <a:r>
-              <a:rPr kumimoji="0" lang="en-US" altLang="ja-JP" sz="1400" b="1" kern="0" dirty="0" smtClean="0">
+              <a:rPr kumimoji="0" lang="en-US" altLang="ja-JP" sz="1400" b="1" kern="0" dirty="0">
                 <a:solidFill>
                   <a:srgbClr val="000000"/>
                 </a:solidFill>
@@ -10273,16 +10125,8 @@
                 <a:ea typeface="HG明朝E" panose="02020909000000000000" pitchFamily="17" charset="-128"/>
                 <a:cs typeface="Calibri" panose="020F0502020204030204" pitchFamily="34" charset="0"/>
               </a:rPr>
-              <a:t>Thing Directory</a:t>
-            </a:r>
-            <a:endParaRPr kumimoji="0" lang="en-US" altLang="ja-JP" sz="1400" b="1" kern="0" dirty="0">
-              <a:solidFill>
-                <a:srgbClr val="000000"/>
-              </a:solidFill>
-              <a:latin typeface="Calibri" panose="020F0502020204030204" pitchFamily="34" charset="0"/>
-              <a:ea typeface="HG明朝E" panose="02020909000000000000" pitchFamily="17" charset="-128"/>
-              <a:cs typeface="Calibri" panose="020F0502020204030204" pitchFamily="34" charset="0"/>
-            </a:endParaRPr>
+              <a:t>Thing Directory A</a:t>
+            </a:r>
           </a:p>
         </p:txBody>
       </p:sp>
@@ -10355,7 +10199,7 @@
               <a:defRPr/>
             </a:pPr>
             <a:r>
-              <a:rPr kumimoji="0" lang="en-US" altLang="ja-JP" sz="1400" b="1" kern="0" dirty="0" smtClean="0">
+              <a:rPr kumimoji="0" lang="en-US" altLang="ja-JP" sz="1400" b="1" kern="0" dirty="0">
                 <a:solidFill>
                   <a:srgbClr val="000000"/>
                 </a:solidFill>
@@ -10365,14 +10209,6 @@
               </a:rPr>
               <a:t>Remote</a:t>
             </a:r>
-            <a:endParaRPr kumimoji="0" lang="en-US" altLang="ja-JP" sz="1400" b="1" kern="0" dirty="0">
-              <a:solidFill>
-                <a:srgbClr val="000000"/>
-              </a:solidFill>
-              <a:latin typeface="Calibri" panose="020F0502020204030204" pitchFamily="34" charset="0"/>
-              <a:ea typeface="HG明朝E" panose="02020909000000000000" pitchFamily="17" charset="-128"/>
-              <a:cs typeface="Calibri" panose="020F0502020204030204" pitchFamily="34" charset="0"/>
-            </a:endParaRPr>
           </a:p>
           <a:p>
             <a:pPr marL="0" marR="0" lvl="0" indent="0" algn="ctr" defTabSz="914400" eaLnBrk="1" fontAlgn="ctr" latinLnBrk="0" hangingPunct="1">
@@ -10393,7 +10229,7 @@
               <a:defRPr/>
             </a:pPr>
             <a:r>
-              <a:rPr kumimoji="0" lang="en-US" altLang="ja-JP" sz="1400" b="1" i="0" u="none" strike="noStrike" kern="0" cap="none" spc="0" normalizeH="0" baseline="0" dirty="0" smtClean="0">
+              <a:rPr kumimoji="0" lang="en-US" altLang="ja-JP" sz="1400" b="1" i="0" u="none" strike="noStrike" kern="0" cap="none" spc="0" normalizeH="0" baseline="0" dirty="0">
                 <a:ln>
                   <a:noFill/>
                 </a:ln>
@@ -10409,20 +10245,6 @@
               </a:rPr>
               <a:t>Servient A</a:t>
             </a:r>
-            <a:endParaRPr kumimoji="0" lang="en-US" altLang="ja-JP" sz="1400" b="1" i="0" u="none" strike="noStrike" kern="0" cap="none" spc="0" normalizeH="0" baseline="0" dirty="0">
-              <a:ln>
-                <a:noFill/>
-              </a:ln>
-              <a:solidFill>
-                <a:srgbClr val="000000"/>
-              </a:solidFill>
-              <a:effectLst/>
-              <a:uLnTx/>
-              <a:uFillTx/>
-              <a:latin typeface="Calibri" panose="020F0502020204030204" pitchFamily="34" charset="0"/>
-              <a:ea typeface="HG明朝E" panose="02020909000000000000" pitchFamily="17" charset="-128"/>
-              <a:cs typeface="Calibri" panose="020F0502020204030204" pitchFamily="34" charset="0"/>
-            </a:endParaRPr>
           </a:p>
         </p:txBody>
       </p:sp>
@@ -10480,7 +10302,7 @@
               <a:defRPr/>
             </a:pPr>
             <a:r>
-              <a:rPr lang="en-US" altLang="ja-JP" sz="1100" kern="0" dirty="0" err="1" smtClean="0">
+              <a:rPr lang="en-US" altLang="ja-JP" sz="1100" kern="0" dirty="0" err="1">
                 <a:solidFill>
                   <a:prstClr val="white"/>
                 </a:solidFill>
@@ -10555,7 +10377,7 @@
               <a:defRPr/>
             </a:pPr>
             <a:r>
-              <a:rPr lang="en-US" altLang="ja-JP" sz="1100" kern="0" dirty="0" err="1" smtClean="0">
+              <a:rPr lang="en-US" altLang="ja-JP" sz="1100" kern="0" dirty="0" err="1">
                 <a:solidFill>
                   <a:prstClr val="white"/>
                 </a:solidFill>
@@ -10693,7 +10515,7 @@
               <a:defRPr/>
             </a:pPr>
             <a:r>
-              <a:rPr kumimoji="0" lang="en-US" altLang="ja-JP" sz="1400" b="1" kern="0" dirty="0" smtClean="0">
+              <a:rPr kumimoji="0" lang="en-US" altLang="ja-JP" sz="1400" b="1" kern="0" dirty="0">
                 <a:solidFill>
                   <a:srgbClr val="000000"/>
                 </a:solidFill>
@@ -10703,14 +10525,6 @@
               </a:rPr>
               <a:t>Local</a:t>
             </a:r>
-            <a:endParaRPr kumimoji="0" lang="en-US" altLang="ja-JP" sz="1400" b="1" kern="0" dirty="0">
-              <a:solidFill>
-                <a:srgbClr val="000000"/>
-              </a:solidFill>
-              <a:latin typeface="Calibri" panose="020F0502020204030204" pitchFamily="34" charset="0"/>
-              <a:ea typeface="HG明朝E" panose="02020909000000000000" pitchFamily="17" charset="-128"/>
-              <a:cs typeface="Calibri" panose="020F0502020204030204" pitchFamily="34" charset="0"/>
-            </a:endParaRPr>
           </a:p>
           <a:p>
             <a:pPr marL="0" marR="0" lvl="0" indent="0" algn="ctr" defTabSz="914400" eaLnBrk="1" fontAlgn="ctr" latinLnBrk="0" hangingPunct="1">
@@ -10731,7 +10545,7 @@
               <a:defRPr/>
             </a:pPr>
             <a:r>
-              <a:rPr kumimoji="0" lang="en-US" altLang="ja-JP" sz="1400" b="1" i="0" u="none" strike="noStrike" kern="0" cap="none" spc="0" normalizeH="0" baseline="0" dirty="0" smtClean="0">
+              <a:rPr kumimoji="0" lang="en-US" altLang="ja-JP" sz="1400" b="1" i="0" u="none" strike="noStrike" kern="0" cap="none" spc="0" normalizeH="0" baseline="0" dirty="0">
                 <a:ln>
                   <a:noFill/>
                 </a:ln>
@@ -10747,20 +10561,6 @@
               </a:rPr>
               <a:t>Servient A</a:t>
             </a:r>
-            <a:endParaRPr kumimoji="0" lang="en-US" altLang="ja-JP" sz="1400" b="1" i="0" u="none" strike="noStrike" kern="0" cap="none" spc="0" normalizeH="0" baseline="0" dirty="0">
-              <a:ln>
-                <a:noFill/>
-              </a:ln>
-              <a:solidFill>
-                <a:srgbClr val="000000"/>
-              </a:solidFill>
-              <a:effectLst/>
-              <a:uLnTx/>
-              <a:uFillTx/>
-              <a:latin typeface="Calibri" panose="020F0502020204030204" pitchFamily="34" charset="0"/>
-              <a:ea typeface="HG明朝E" panose="02020909000000000000" pitchFamily="17" charset="-128"/>
-              <a:cs typeface="Calibri" panose="020F0502020204030204" pitchFamily="34" charset="0"/>
-            </a:endParaRPr>
           </a:p>
         </p:txBody>
       </p:sp>
@@ -10833,7 +10633,7 @@
               <a:defRPr/>
             </a:pPr>
             <a:r>
-              <a:rPr kumimoji="0" lang="en-US" altLang="ja-JP" sz="1400" b="1" kern="0" dirty="0" smtClean="0">
+              <a:rPr kumimoji="0" lang="en-US" altLang="ja-JP" sz="1400" b="1" kern="0" dirty="0">
                 <a:solidFill>
                   <a:srgbClr val="000000"/>
                 </a:solidFill>
@@ -10841,18 +10641,7 @@
                 <a:ea typeface="HG明朝E" panose="02020909000000000000" pitchFamily="17" charset="-128"/>
                 <a:cs typeface="Calibri" panose="020F0502020204030204" pitchFamily="34" charset="0"/>
               </a:rPr>
-              <a:t>Server </a:t>
-            </a:r>
-            <a:r>
-              <a:rPr kumimoji="0" lang="en-US" altLang="ja-JP" sz="1400" b="1" kern="0" dirty="0" smtClean="0">
-                <a:solidFill>
-                  <a:srgbClr val="000000"/>
-                </a:solidFill>
-                <a:latin typeface="Calibri" panose="020F0502020204030204" pitchFamily="34" charset="0"/>
-                <a:ea typeface="HG明朝E" panose="02020909000000000000" pitchFamily="17" charset="-128"/>
-                <a:cs typeface="Calibri" panose="020F0502020204030204" pitchFamily="34" charset="0"/>
-              </a:rPr>
-              <a:t>A</a:t>
+              <a:t>Server A</a:t>
             </a:r>
             <a:endParaRPr kumimoji="0" lang="en-US" altLang="ja-JP" sz="1400" b="1" i="0" u="none" strike="noStrike" kern="0" cap="none" spc="0" normalizeH="0" baseline="0" dirty="0">
               <a:ln>
@@ -10988,7 +10777,7 @@
               <a:defRPr/>
             </a:pPr>
             <a:r>
-              <a:rPr kumimoji="0" lang="en-US" altLang="ja-JP" sz="1400" b="1" kern="0" dirty="0" smtClean="0">
+              <a:rPr kumimoji="0" lang="en-US" altLang="ja-JP" sz="1400" b="1" kern="0" dirty="0">
                 <a:solidFill>
                   <a:srgbClr val="000000"/>
                 </a:solidFill>
@@ -10999,7 +10788,7 @@
               <a:t>Client </a:t>
             </a:r>
             <a:r>
-              <a:rPr kumimoji="0" lang="en-US" altLang="ja-JP" sz="1400" b="1" i="0" u="none" strike="noStrike" kern="0" cap="none" spc="0" normalizeH="0" baseline="0" dirty="0" smtClean="0">
+              <a:rPr kumimoji="0" lang="en-US" altLang="ja-JP" sz="1400" b="1" i="0" u="none" strike="noStrike" kern="0" cap="none" spc="0" normalizeH="0" baseline="0" dirty="0">
                 <a:ln>
                   <a:noFill/>
                 </a:ln>
@@ -11015,20 +10804,6 @@
               </a:rPr>
               <a:t>A</a:t>
             </a:r>
-            <a:endParaRPr kumimoji="0" lang="en-US" altLang="ja-JP" sz="1400" b="1" i="0" u="none" strike="noStrike" kern="0" cap="none" spc="0" normalizeH="0" baseline="0" dirty="0">
-              <a:ln>
-                <a:noFill/>
-              </a:ln>
-              <a:solidFill>
-                <a:srgbClr val="000000"/>
-              </a:solidFill>
-              <a:effectLst/>
-              <a:uLnTx/>
-              <a:uFillTx/>
-              <a:latin typeface="Calibri" panose="020F0502020204030204" pitchFamily="34" charset="0"/>
-              <a:ea typeface="HG明朝E" panose="02020909000000000000" pitchFamily="17" charset="-128"/>
-              <a:cs typeface="Calibri" panose="020F0502020204030204" pitchFamily="34" charset="0"/>
-            </a:endParaRPr>
           </a:p>
         </p:txBody>
       </p:sp>
@@ -11086,7 +10861,7 @@
               <a:defRPr/>
             </a:pPr>
             <a:r>
-              <a:rPr lang="en-US" altLang="ja-JP" sz="1100" kern="0" dirty="0" err="1" smtClean="0">
+              <a:rPr lang="en-US" altLang="ja-JP" sz="1100" kern="0" dirty="0" err="1">
                 <a:solidFill>
                   <a:prstClr val="white"/>
                 </a:solidFill>
@@ -11161,7 +10936,7 @@
               <a:defRPr/>
             </a:pPr>
             <a:r>
-              <a:rPr lang="en-US" altLang="ja-JP" sz="1100" kern="0" dirty="0" err="1" smtClean="0">
+              <a:rPr lang="en-US" altLang="ja-JP" sz="1100" kern="0" dirty="0" err="1">
                 <a:solidFill>
                   <a:prstClr val="white"/>
                 </a:solidFill>
@@ -11236,7 +11011,7 @@
               <a:defRPr/>
             </a:pPr>
             <a:r>
-              <a:rPr lang="en-US" altLang="ja-JP" sz="1100" kern="0" dirty="0" err="1" smtClean="0">
+              <a:rPr lang="en-US" altLang="ja-JP" sz="1100" kern="0" dirty="0" err="1">
                 <a:solidFill>
                   <a:prstClr val="white"/>
                 </a:solidFill>
@@ -11311,7 +11086,7 @@
               <a:defRPr/>
             </a:pPr>
             <a:r>
-              <a:rPr lang="en-US" altLang="ja-JP" sz="1100" kern="0" dirty="0" err="1" smtClean="0">
+              <a:rPr lang="en-US" altLang="ja-JP" sz="1100" kern="0" dirty="0" err="1">
                 <a:solidFill>
                   <a:prstClr val="white"/>
                 </a:solidFill>
@@ -11448,96 +11223,6 @@
             <a:endParaRPr lang="en-US" sz="2000">
               <a:latin typeface="+mj-lt"/>
               <a:cs typeface="Arial" pitchFamily="34" charset="0"/>
-            </a:endParaRPr>
-          </a:p>
-        </p:txBody>
-      </p:sp>
-      <p:sp>
-        <p:nvSpPr>
-          <p:cNvPr id="116" name="角丸四角形 6">
-            <a:extLst>
-              <a:ext uri="{FF2B5EF4-FFF2-40B4-BE49-F238E27FC236}">
-                <a16:creationId xmlns:a16="http://schemas.microsoft.com/office/drawing/2014/main" id="{07963EC9-8D4B-41E4-BC85-A0448AE81D2D}"/>
-              </a:ext>
-            </a:extLst>
-          </p:cNvPr>
-          <p:cNvSpPr/>
-          <p:nvPr/>
-        </p:nvSpPr>
-        <p:spPr bwMode="auto">
-          <a:xfrm flipH="1">
-            <a:off x="4854610" y="1768486"/>
-            <a:ext cx="1229557" cy="547242"/>
-          </a:xfrm>
-          <a:prstGeom prst="roundRect">
-            <a:avLst>
-              <a:gd name="adj" fmla="val 4472"/>
-            </a:avLst>
-          </a:prstGeom>
-          <a:ln>
-            <a:headEnd type="none" w="med" len="med"/>
-            <a:tailEnd type="none" w="med" len="med"/>
-          </a:ln>
-          <a:extLst/>
-        </p:spPr>
-        <p:style>
-          <a:lnRef idx="2">
-            <a:schemeClr val="dk1"/>
-          </a:lnRef>
-          <a:fillRef idx="1">
-            <a:schemeClr val="lt1"/>
-          </a:fillRef>
-          <a:effectRef idx="0">
-            <a:schemeClr val="dk1"/>
-          </a:effectRef>
-          <a:fontRef idx="minor">
-            <a:schemeClr val="dk1"/>
-          </a:fontRef>
-        </p:style>
-        <p:txBody>
-          <a:bodyPr vert="horz" wrap="none" lIns="0" tIns="0" rIns="0" bIns="0" numCol="1" rtlCol="0" anchor="ctr" anchorCtr="0" compatLnSpc="1">
-            <a:prstTxWarp prst="textNoShape">
-              <a:avLst/>
-            </a:prstTxWarp>
-            <a:noAutofit/>
-          </a:bodyPr>
-          <a:lstStyle/>
-          <a:p>
-            <a:pPr marL="0" marR="0" lvl="0" indent="0" algn="ctr" defTabSz="914400" eaLnBrk="1" fontAlgn="ctr" latinLnBrk="0" hangingPunct="1">
-              <a:lnSpc>
-                <a:spcPct val="75000"/>
-              </a:lnSpc>
-              <a:spcBef>
-                <a:spcPts val="0"/>
-              </a:spcBef>
-              <a:spcAft>
-                <a:spcPts val="0"/>
-              </a:spcAft>
-              <a:buClrTx/>
-              <a:buSzTx/>
-              <a:buFontTx/>
-              <a:buNone/>
-              <a:tabLst/>
-              <a:defRPr/>
-            </a:pPr>
-            <a:r>
-              <a:rPr kumimoji="0" lang="en-US" altLang="ja-JP" sz="1400" b="1" kern="0" dirty="0" smtClean="0">
-                <a:solidFill>
-                  <a:srgbClr val="000000"/>
-                </a:solidFill>
-                <a:latin typeface="Calibri" panose="020F0502020204030204" pitchFamily="34" charset="0"/>
-                <a:ea typeface="HG明朝E" panose="02020909000000000000" pitchFamily="17" charset="-128"/>
-                <a:cs typeface="Calibri" panose="020F0502020204030204" pitchFamily="34" charset="0"/>
-              </a:rPr>
-              <a:t>Thing Directory</a:t>
-            </a:r>
-            <a:endParaRPr kumimoji="0" lang="en-US" altLang="ja-JP" sz="1400" b="1" kern="0" dirty="0">
-              <a:solidFill>
-                <a:srgbClr val="000000"/>
-              </a:solidFill>
-              <a:latin typeface="Calibri" panose="020F0502020204030204" pitchFamily="34" charset="0"/>
-              <a:ea typeface="HG明朝E" panose="02020909000000000000" pitchFamily="17" charset="-128"/>
-              <a:cs typeface="Calibri" panose="020F0502020204030204" pitchFamily="34" charset="0"/>
             </a:endParaRPr>
           </a:p>
         </p:txBody>
@@ -11611,7 +11296,7 @@
               <a:defRPr/>
             </a:pPr>
             <a:r>
-              <a:rPr kumimoji="0" lang="en-US" altLang="ja-JP" sz="1400" b="1" kern="0" dirty="0" smtClean="0">
+              <a:rPr kumimoji="0" lang="en-US" altLang="ja-JP" sz="1400" b="1" kern="0" dirty="0">
                 <a:solidFill>
                   <a:srgbClr val="000000"/>
                 </a:solidFill>
@@ -11621,14 +11306,6 @@
               </a:rPr>
               <a:t>Remote</a:t>
             </a:r>
-            <a:endParaRPr kumimoji="0" lang="en-US" altLang="ja-JP" sz="1400" b="1" kern="0" dirty="0">
-              <a:solidFill>
-                <a:srgbClr val="000000"/>
-              </a:solidFill>
-              <a:latin typeface="Calibri" panose="020F0502020204030204" pitchFamily="34" charset="0"/>
-              <a:ea typeface="HG明朝E" panose="02020909000000000000" pitchFamily="17" charset="-128"/>
-              <a:cs typeface="Calibri" panose="020F0502020204030204" pitchFamily="34" charset="0"/>
-            </a:endParaRPr>
           </a:p>
           <a:p>
             <a:pPr marL="0" marR="0" lvl="0" indent="0" algn="ctr" defTabSz="914400" eaLnBrk="1" fontAlgn="ctr" latinLnBrk="0" hangingPunct="1">
@@ -11649,7 +11326,7 @@
               <a:defRPr/>
             </a:pPr>
             <a:r>
-              <a:rPr kumimoji="0" lang="en-US" altLang="ja-JP" sz="1400" b="1" i="0" u="none" strike="noStrike" kern="0" cap="none" spc="0" normalizeH="0" baseline="0" dirty="0" smtClean="0">
+              <a:rPr kumimoji="0" lang="en-US" altLang="ja-JP" sz="1400" b="1" i="0" u="none" strike="noStrike" kern="0" cap="none" spc="0" normalizeH="0" baseline="0" dirty="0">
                 <a:ln>
                   <a:noFill/>
                 </a:ln>
@@ -11665,20 +11342,6 @@
               </a:rPr>
               <a:t>Servient B</a:t>
             </a:r>
-            <a:endParaRPr kumimoji="0" lang="en-US" altLang="ja-JP" sz="1400" b="1" i="0" u="none" strike="noStrike" kern="0" cap="none" spc="0" normalizeH="0" baseline="0" dirty="0">
-              <a:ln>
-                <a:noFill/>
-              </a:ln>
-              <a:solidFill>
-                <a:srgbClr val="000000"/>
-              </a:solidFill>
-              <a:effectLst/>
-              <a:uLnTx/>
-              <a:uFillTx/>
-              <a:latin typeface="Calibri" panose="020F0502020204030204" pitchFamily="34" charset="0"/>
-              <a:ea typeface="HG明朝E" panose="02020909000000000000" pitchFamily="17" charset="-128"/>
-              <a:cs typeface="Calibri" panose="020F0502020204030204" pitchFamily="34" charset="0"/>
-            </a:endParaRPr>
           </a:p>
         </p:txBody>
       </p:sp>
@@ -11736,7 +11399,7 @@
               <a:defRPr/>
             </a:pPr>
             <a:r>
-              <a:rPr lang="en-US" altLang="ja-JP" sz="1100" kern="0" dirty="0" err="1" smtClean="0">
+              <a:rPr lang="en-US" altLang="ja-JP" sz="1100" kern="0" dirty="0" err="1">
                 <a:solidFill>
                   <a:prstClr val="white"/>
                 </a:solidFill>
@@ -11811,7 +11474,7 @@
               <a:defRPr/>
             </a:pPr>
             <a:r>
-              <a:rPr lang="en-US" altLang="ja-JP" sz="1100" kern="0" dirty="0" err="1" smtClean="0">
+              <a:rPr lang="en-US" altLang="ja-JP" sz="1100" kern="0" dirty="0" err="1">
                 <a:solidFill>
                   <a:prstClr val="white"/>
                 </a:solidFill>
@@ -11996,7 +11659,7 @@
               <a:defRPr/>
             </a:pPr>
             <a:r>
-              <a:rPr kumimoji="0" lang="en-US" altLang="ja-JP" sz="1400" b="1" kern="0" dirty="0" smtClean="0">
+              <a:rPr kumimoji="0" lang="en-US" altLang="ja-JP" sz="1400" b="1" kern="0" dirty="0">
                 <a:solidFill>
                   <a:srgbClr val="000000"/>
                 </a:solidFill>
@@ -12006,14 +11669,6 @@
               </a:rPr>
               <a:t>Local</a:t>
             </a:r>
-            <a:endParaRPr kumimoji="0" lang="en-US" altLang="ja-JP" sz="1400" b="1" kern="0" dirty="0">
-              <a:solidFill>
-                <a:srgbClr val="000000"/>
-              </a:solidFill>
-              <a:latin typeface="Calibri" panose="020F0502020204030204" pitchFamily="34" charset="0"/>
-              <a:ea typeface="HG明朝E" panose="02020909000000000000" pitchFamily="17" charset="-128"/>
-              <a:cs typeface="Calibri" panose="020F0502020204030204" pitchFamily="34" charset="0"/>
-            </a:endParaRPr>
           </a:p>
           <a:p>
             <a:pPr marL="0" marR="0" lvl="0" indent="0" algn="ctr" defTabSz="914400" eaLnBrk="1" fontAlgn="ctr" latinLnBrk="0" hangingPunct="1">
@@ -12034,7 +11689,7 @@
               <a:defRPr/>
             </a:pPr>
             <a:r>
-              <a:rPr kumimoji="0" lang="en-US" altLang="ja-JP" sz="1400" b="1" i="0" u="none" strike="noStrike" kern="0" cap="none" spc="0" normalizeH="0" baseline="0" dirty="0" smtClean="0">
+              <a:rPr kumimoji="0" lang="en-US" altLang="ja-JP" sz="1400" b="1" i="0" u="none" strike="noStrike" kern="0" cap="none" spc="0" normalizeH="0" baseline="0" dirty="0">
                 <a:ln>
                   <a:noFill/>
                 </a:ln>
@@ -12050,20 +11705,6 @@
               </a:rPr>
               <a:t>Servient B</a:t>
             </a:r>
-            <a:endParaRPr kumimoji="0" lang="en-US" altLang="ja-JP" sz="1400" b="1" i="0" u="none" strike="noStrike" kern="0" cap="none" spc="0" normalizeH="0" baseline="0" dirty="0">
-              <a:ln>
-                <a:noFill/>
-              </a:ln>
-              <a:solidFill>
-                <a:srgbClr val="000000"/>
-              </a:solidFill>
-              <a:effectLst/>
-              <a:uLnTx/>
-              <a:uFillTx/>
-              <a:latin typeface="Calibri" panose="020F0502020204030204" pitchFamily="34" charset="0"/>
-              <a:ea typeface="HG明朝E" panose="02020909000000000000" pitchFamily="17" charset="-128"/>
-              <a:cs typeface="Calibri" panose="020F0502020204030204" pitchFamily="34" charset="0"/>
-            </a:endParaRPr>
           </a:p>
         </p:txBody>
       </p:sp>
@@ -12136,7 +11777,7 @@
               <a:defRPr/>
             </a:pPr>
             <a:r>
-              <a:rPr kumimoji="0" lang="en-US" altLang="ja-JP" sz="1400" b="1" kern="0" dirty="0" smtClean="0">
+              <a:rPr kumimoji="0" lang="en-US" altLang="ja-JP" sz="1400" b="1" kern="0" dirty="0">
                 <a:solidFill>
                   <a:srgbClr val="000000"/>
                 </a:solidFill>
@@ -12280,7 +11921,7 @@
               <a:defRPr/>
             </a:pPr>
             <a:r>
-              <a:rPr kumimoji="0" lang="en-US" altLang="ja-JP" sz="1400" b="1" kern="0" dirty="0" smtClean="0">
+              <a:rPr kumimoji="0" lang="en-US" altLang="ja-JP" sz="1400" b="1" kern="0" dirty="0">
                 <a:solidFill>
                   <a:srgbClr val="000000"/>
                 </a:solidFill>
@@ -12291,7 +11932,7 @@
               <a:t>Client </a:t>
             </a:r>
             <a:r>
-              <a:rPr kumimoji="0" lang="en-US" altLang="ja-JP" sz="1400" b="1" i="0" u="none" strike="noStrike" kern="0" cap="none" spc="0" normalizeH="0" baseline="0" dirty="0" smtClean="0">
+              <a:rPr kumimoji="0" lang="en-US" altLang="ja-JP" sz="1400" b="1" i="0" u="none" strike="noStrike" kern="0" cap="none" spc="0" normalizeH="0" baseline="0" dirty="0">
                 <a:ln>
                   <a:noFill/>
                 </a:ln>
@@ -12307,20 +11948,6 @@
               </a:rPr>
               <a:t>B</a:t>
             </a:r>
-            <a:endParaRPr kumimoji="0" lang="en-US" altLang="ja-JP" sz="1400" b="1" i="0" u="none" strike="noStrike" kern="0" cap="none" spc="0" normalizeH="0" baseline="0" dirty="0">
-              <a:ln>
-                <a:noFill/>
-              </a:ln>
-              <a:solidFill>
-                <a:srgbClr val="000000"/>
-              </a:solidFill>
-              <a:effectLst/>
-              <a:uLnTx/>
-              <a:uFillTx/>
-              <a:latin typeface="Calibri" panose="020F0502020204030204" pitchFamily="34" charset="0"/>
-              <a:ea typeface="HG明朝E" panose="02020909000000000000" pitchFamily="17" charset="-128"/>
-              <a:cs typeface="Calibri" panose="020F0502020204030204" pitchFamily="34" charset="0"/>
-            </a:endParaRPr>
           </a:p>
         </p:txBody>
       </p:sp>
@@ -12378,7 +12005,7 @@
               <a:defRPr/>
             </a:pPr>
             <a:r>
-              <a:rPr lang="en-US" altLang="ja-JP" sz="1100" kern="0" dirty="0" err="1" smtClean="0">
+              <a:rPr lang="en-US" altLang="ja-JP" sz="1100" kern="0" dirty="0" err="1">
                 <a:solidFill>
                   <a:prstClr val="white"/>
                 </a:solidFill>
@@ -12453,7 +12080,7 @@
               <a:defRPr/>
             </a:pPr>
             <a:r>
-              <a:rPr lang="en-US" altLang="ja-JP" sz="1100" kern="0" dirty="0" err="1" smtClean="0">
+              <a:rPr lang="en-US" altLang="ja-JP" sz="1100" kern="0" dirty="0" err="1">
                 <a:solidFill>
                   <a:prstClr val="white"/>
                 </a:solidFill>
@@ -12528,7 +12155,7 @@
               <a:defRPr/>
             </a:pPr>
             <a:r>
-              <a:rPr lang="en-US" altLang="ja-JP" sz="1100" kern="0" dirty="0" err="1" smtClean="0">
+              <a:rPr lang="en-US" altLang="ja-JP" sz="1100" kern="0" dirty="0" err="1">
                 <a:solidFill>
                   <a:prstClr val="white"/>
                 </a:solidFill>
@@ -12603,7 +12230,7 @@
               <a:defRPr/>
             </a:pPr>
             <a:r>
-              <a:rPr lang="en-US" altLang="ja-JP" sz="1100" kern="0" dirty="0" err="1" smtClean="0">
+              <a:rPr lang="en-US" altLang="ja-JP" sz="1100" kern="0" dirty="0" err="1">
                 <a:solidFill>
                   <a:prstClr val="white"/>
                 </a:solidFill>
@@ -12879,6 +12506,88 @@
           </a:fontRef>
         </p:style>
       </p:cxnSp>
+      <p:sp>
+        <p:nvSpPr>
+          <p:cNvPr id="44" name="角丸四角形 6">
+            <a:extLst>
+              <a:ext uri="{FF2B5EF4-FFF2-40B4-BE49-F238E27FC236}">
+                <a16:creationId xmlns:a16="http://schemas.microsoft.com/office/drawing/2014/main" id="{55EB21C0-E220-4B10-A394-464824633C18}"/>
+              </a:ext>
+            </a:extLst>
+          </p:cNvPr>
+          <p:cNvSpPr/>
+          <p:nvPr/>
+        </p:nvSpPr>
+        <p:spPr bwMode="auto">
+          <a:xfrm flipH="1">
+            <a:off x="4863609" y="1772816"/>
+            <a:ext cx="1423474" cy="547242"/>
+          </a:xfrm>
+          <a:prstGeom prst="roundRect">
+            <a:avLst>
+              <a:gd name="adj" fmla="val 4472"/>
+            </a:avLst>
+          </a:prstGeom>
+          <a:ln>
+            <a:headEnd type="none" w="med" len="med"/>
+            <a:tailEnd type="none" w="med" len="med"/>
+          </a:ln>
+          <a:extLst/>
+        </p:spPr>
+        <p:style>
+          <a:lnRef idx="2">
+            <a:schemeClr val="dk1"/>
+          </a:lnRef>
+          <a:fillRef idx="1">
+            <a:schemeClr val="lt1"/>
+          </a:fillRef>
+          <a:effectRef idx="0">
+            <a:schemeClr val="dk1"/>
+          </a:effectRef>
+          <a:fontRef idx="minor">
+            <a:schemeClr val="dk1"/>
+          </a:fontRef>
+        </p:style>
+        <p:txBody>
+          <a:bodyPr vert="horz" wrap="none" lIns="0" tIns="0" rIns="0" bIns="0" numCol="1" rtlCol="0" anchor="ctr" anchorCtr="0" compatLnSpc="1">
+            <a:prstTxWarp prst="textNoShape">
+              <a:avLst/>
+            </a:prstTxWarp>
+            <a:noAutofit/>
+          </a:bodyPr>
+          <a:lstStyle/>
+          <a:p>
+            <a:pPr marL="0" marR="0" lvl="0" indent="0" algn="ctr" defTabSz="914400" eaLnBrk="1" fontAlgn="ctr" latinLnBrk="0" hangingPunct="1">
+              <a:lnSpc>
+                <a:spcPct val="75000"/>
+              </a:lnSpc>
+              <a:spcBef>
+                <a:spcPts val="0"/>
+              </a:spcBef>
+              <a:spcAft>
+                <a:spcPts val="0"/>
+              </a:spcAft>
+              <a:buClrTx/>
+              <a:buSzTx/>
+              <a:buFontTx/>
+              <a:buNone/>
+              <a:tabLst/>
+              <a:defRPr/>
+            </a:pPr>
+            <a:r>
+              <a:rPr kumimoji="0" lang="en-US" altLang="ja-JP" sz="1400" b="1" kern="0" dirty="0">
+                <a:solidFill>
+                  <a:srgbClr val="000000"/>
+                </a:solidFill>
+                <a:latin typeface="Calibri" panose="020F0502020204030204" pitchFamily="34" charset="0"/>
+                <a:ea typeface="HG明朝E" panose="02020909000000000000" pitchFamily="17" charset="-128"/>
+                <a:cs typeface="Calibri" panose="020F0502020204030204" pitchFamily="34" charset="0"/>
+              </a:rPr>
+              <a:t>Thing Directory B</a:t>
+            </a:r>
+          </a:p>
+        </p:txBody>
+      </p:sp>
     </p:spTree>
     <p:extLst>
       <p:ext uri="{BB962C8B-B14F-4D97-AF65-F5344CB8AC3E}">
@@ -13070,15 +12779,7 @@
             </a:br>
             <a:r>
               <a:rPr lang="en-US" altLang="ja-JP" sz="2400" dirty="0"/>
-              <a:t>multiple cloud connect through </a:t>
-            </a:r>
-            <a:r>
-              <a:rPr lang="en-US" altLang="ja-JP" sz="2400" dirty="0" smtClean="0"/>
-              <a:t>servient </a:t>
-            </a:r>
-            <a:r>
-              <a:rPr lang="en-US" altLang="ja-JP" sz="2400" dirty="0"/>
-              <a:t>synchronization</a:t>
+              <a:t>multiple cloud connect through servient synchronization</a:t>
             </a:r>
             <a:endParaRPr kumimoji="1" lang="ja-JP" altLang="en-US" sz="2400" dirty="0"/>
           </a:p>
@@ -13234,96 +12935,6 @@
             <a:endParaRPr lang="en-US" sz="2000">
               <a:latin typeface="+mj-lt"/>
               <a:cs typeface="Arial" pitchFamily="34" charset="0"/>
-            </a:endParaRPr>
-          </a:p>
-        </p:txBody>
-      </p:sp>
-      <p:sp>
-        <p:nvSpPr>
-          <p:cNvPr id="80" name="角丸四角形 6">
-            <a:extLst>
-              <a:ext uri="{FF2B5EF4-FFF2-40B4-BE49-F238E27FC236}">
-                <a16:creationId xmlns:a16="http://schemas.microsoft.com/office/drawing/2014/main" id="{07963EC9-8D4B-41E4-BC85-A0448AE81D2D}"/>
-              </a:ext>
-            </a:extLst>
-          </p:cNvPr>
-          <p:cNvSpPr/>
-          <p:nvPr/>
-        </p:nvSpPr>
-        <p:spPr bwMode="auto">
-          <a:xfrm>
-            <a:off x="2915817" y="1772816"/>
-            <a:ext cx="1218012" cy="547242"/>
-          </a:xfrm>
-          <a:prstGeom prst="roundRect">
-            <a:avLst>
-              <a:gd name="adj" fmla="val 4472"/>
-            </a:avLst>
-          </a:prstGeom>
-          <a:ln>
-            <a:headEnd type="none" w="med" len="med"/>
-            <a:tailEnd type="none" w="med" len="med"/>
-          </a:ln>
-          <a:extLst/>
-        </p:spPr>
-        <p:style>
-          <a:lnRef idx="2">
-            <a:schemeClr val="dk1"/>
-          </a:lnRef>
-          <a:fillRef idx="1">
-            <a:schemeClr val="lt1"/>
-          </a:fillRef>
-          <a:effectRef idx="0">
-            <a:schemeClr val="dk1"/>
-          </a:effectRef>
-          <a:fontRef idx="minor">
-            <a:schemeClr val="dk1"/>
-          </a:fontRef>
-        </p:style>
-        <p:txBody>
-          <a:bodyPr vert="horz" wrap="none" lIns="0" tIns="0" rIns="0" bIns="0" numCol="1" rtlCol="0" anchor="ctr" anchorCtr="0" compatLnSpc="1">
-            <a:prstTxWarp prst="textNoShape">
-              <a:avLst/>
-            </a:prstTxWarp>
-            <a:noAutofit/>
-          </a:bodyPr>
-          <a:lstStyle/>
-          <a:p>
-            <a:pPr marL="0" marR="0" lvl="0" indent="0" algn="ctr" defTabSz="914400" eaLnBrk="1" fontAlgn="ctr" latinLnBrk="0" hangingPunct="1">
-              <a:lnSpc>
-                <a:spcPct val="75000"/>
-              </a:lnSpc>
-              <a:spcBef>
-                <a:spcPts val="0"/>
-              </a:spcBef>
-              <a:spcAft>
-                <a:spcPts val="0"/>
-              </a:spcAft>
-              <a:buClrTx/>
-              <a:buSzTx/>
-              <a:buFontTx/>
-              <a:buNone/>
-              <a:tabLst/>
-              <a:defRPr/>
-            </a:pPr>
-            <a:r>
-              <a:rPr kumimoji="0" lang="en-US" altLang="ja-JP" sz="1400" b="1" kern="0" dirty="0" smtClean="0">
-                <a:solidFill>
-                  <a:srgbClr val="000000"/>
-                </a:solidFill>
-                <a:latin typeface="Calibri" panose="020F0502020204030204" pitchFamily="34" charset="0"/>
-                <a:ea typeface="HG明朝E" panose="02020909000000000000" pitchFamily="17" charset="-128"/>
-                <a:cs typeface="Calibri" panose="020F0502020204030204" pitchFamily="34" charset="0"/>
-              </a:rPr>
-              <a:t>Thing Directory</a:t>
-            </a:r>
-            <a:endParaRPr kumimoji="0" lang="en-US" altLang="ja-JP" sz="1400" b="1" kern="0" dirty="0">
-              <a:solidFill>
-                <a:srgbClr val="000000"/>
-              </a:solidFill>
-              <a:latin typeface="Calibri" panose="020F0502020204030204" pitchFamily="34" charset="0"/>
-              <a:ea typeface="HG明朝E" panose="02020909000000000000" pitchFamily="17" charset="-128"/>
-              <a:cs typeface="Calibri" panose="020F0502020204030204" pitchFamily="34" charset="0"/>
             </a:endParaRPr>
           </a:p>
         </p:txBody>
@@ -13397,7 +13008,7 @@
               <a:defRPr/>
             </a:pPr>
             <a:r>
-              <a:rPr kumimoji="0" lang="en-US" altLang="ja-JP" sz="1400" b="1" kern="0" dirty="0" smtClean="0">
+              <a:rPr kumimoji="0" lang="en-US" altLang="ja-JP" sz="1400" b="1" kern="0" dirty="0">
                 <a:solidFill>
                   <a:srgbClr val="000000"/>
                 </a:solidFill>
@@ -13407,14 +13018,6 @@
               </a:rPr>
               <a:t>Remote</a:t>
             </a:r>
-            <a:endParaRPr kumimoji="0" lang="en-US" altLang="ja-JP" sz="1400" b="1" kern="0" dirty="0">
-              <a:solidFill>
-                <a:srgbClr val="000000"/>
-              </a:solidFill>
-              <a:latin typeface="Calibri" panose="020F0502020204030204" pitchFamily="34" charset="0"/>
-              <a:ea typeface="HG明朝E" panose="02020909000000000000" pitchFamily="17" charset="-128"/>
-              <a:cs typeface="Calibri" panose="020F0502020204030204" pitchFamily="34" charset="0"/>
-            </a:endParaRPr>
           </a:p>
           <a:p>
             <a:pPr marL="0" marR="0" lvl="0" indent="0" algn="ctr" defTabSz="914400" eaLnBrk="1" fontAlgn="ctr" latinLnBrk="0" hangingPunct="1">
@@ -13435,7 +13038,7 @@
               <a:defRPr/>
             </a:pPr>
             <a:r>
-              <a:rPr kumimoji="0" lang="en-US" altLang="ja-JP" sz="1400" b="1" i="0" u="none" strike="noStrike" kern="0" cap="none" spc="0" normalizeH="0" baseline="0" dirty="0" smtClean="0">
+              <a:rPr kumimoji="0" lang="en-US" altLang="ja-JP" sz="1400" b="1" i="0" u="none" strike="noStrike" kern="0" cap="none" spc="0" normalizeH="0" baseline="0" dirty="0">
                 <a:ln>
                   <a:noFill/>
                 </a:ln>
@@ -13451,20 +13054,6 @@
               </a:rPr>
               <a:t>Servient A</a:t>
             </a:r>
-            <a:endParaRPr kumimoji="0" lang="en-US" altLang="ja-JP" sz="1400" b="1" i="0" u="none" strike="noStrike" kern="0" cap="none" spc="0" normalizeH="0" baseline="0" dirty="0">
-              <a:ln>
-                <a:noFill/>
-              </a:ln>
-              <a:solidFill>
-                <a:srgbClr val="000000"/>
-              </a:solidFill>
-              <a:effectLst/>
-              <a:uLnTx/>
-              <a:uFillTx/>
-              <a:latin typeface="Calibri" panose="020F0502020204030204" pitchFamily="34" charset="0"/>
-              <a:ea typeface="HG明朝E" panose="02020909000000000000" pitchFamily="17" charset="-128"/>
-              <a:cs typeface="Calibri" panose="020F0502020204030204" pitchFamily="34" charset="0"/>
-            </a:endParaRPr>
           </a:p>
         </p:txBody>
       </p:sp>
@@ -13522,7 +13111,7 @@
               <a:defRPr/>
             </a:pPr>
             <a:r>
-              <a:rPr lang="en-US" altLang="ja-JP" sz="1100" kern="0" dirty="0" err="1" smtClean="0">
+              <a:rPr lang="en-US" altLang="ja-JP" sz="1100" kern="0" dirty="0" err="1">
                 <a:solidFill>
                   <a:prstClr val="white"/>
                 </a:solidFill>
@@ -13597,7 +13186,7 @@
               <a:defRPr/>
             </a:pPr>
             <a:r>
-              <a:rPr lang="en-US" altLang="ja-JP" sz="1100" kern="0" dirty="0" err="1" smtClean="0">
+              <a:rPr lang="en-US" altLang="ja-JP" sz="1100" kern="0" dirty="0" err="1">
                 <a:solidFill>
                   <a:prstClr val="white"/>
                 </a:solidFill>
@@ -13735,7 +13324,7 @@
               <a:defRPr/>
             </a:pPr>
             <a:r>
-              <a:rPr kumimoji="0" lang="en-US" altLang="ja-JP" sz="1400" b="1" kern="0" dirty="0" smtClean="0">
+              <a:rPr kumimoji="0" lang="en-US" altLang="ja-JP" sz="1400" b="1" kern="0" dirty="0">
                 <a:solidFill>
                   <a:srgbClr val="000000"/>
                 </a:solidFill>
@@ -13745,14 +13334,6 @@
               </a:rPr>
               <a:t>Local</a:t>
             </a:r>
-            <a:endParaRPr kumimoji="0" lang="en-US" altLang="ja-JP" sz="1400" b="1" kern="0" dirty="0">
-              <a:solidFill>
-                <a:srgbClr val="000000"/>
-              </a:solidFill>
-              <a:latin typeface="Calibri" panose="020F0502020204030204" pitchFamily="34" charset="0"/>
-              <a:ea typeface="HG明朝E" panose="02020909000000000000" pitchFamily="17" charset="-128"/>
-              <a:cs typeface="Calibri" panose="020F0502020204030204" pitchFamily="34" charset="0"/>
-            </a:endParaRPr>
           </a:p>
           <a:p>
             <a:pPr marL="0" marR="0" lvl="0" indent="0" algn="ctr" defTabSz="914400" eaLnBrk="1" fontAlgn="ctr" latinLnBrk="0" hangingPunct="1">
@@ -13773,7 +13354,7 @@
               <a:defRPr/>
             </a:pPr>
             <a:r>
-              <a:rPr kumimoji="0" lang="en-US" altLang="ja-JP" sz="1400" b="1" i="0" u="none" strike="noStrike" kern="0" cap="none" spc="0" normalizeH="0" baseline="0" dirty="0" smtClean="0">
+              <a:rPr kumimoji="0" lang="en-US" altLang="ja-JP" sz="1400" b="1" i="0" u="none" strike="noStrike" kern="0" cap="none" spc="0" normalizeH="0" baseline="0" dirty="0">
                 <a:ln>
                   <a:noFill/>
                 </a:ln>
@@ -13789,20 +13370,6 @@
               </a:rPr>
               <a:t>Servient A</a:t>
             </a:r>
-            <a:endParaRPr kumimoji="0" lang="en-US" altLang="ja-JP" sz="1400" b="1" i="0" u="none" strike="noStrike" kern="0" cap="none" spc="0" normalizeH="0" baseline="0" dirty="0">
-              <a:ln>
-                <a:noFill/>
-              </a:ln>
-              <a:solidFill>
-                <a:srgbClr val="000000"/>
-              </a:solidFill>
-              <a:effectLst/>
-              <a:uLnTx/>
-              <a:uFillTx/>
-              <a:latin typeface="Calibri" panose="020F0502020204030204" pitchFamily="34" charset="0"/>
-              <a:ea typeface="HG明朝E" panose="02020909000000000000" pitchFamily="17" charset="-128"/>
-              <a:cs typeface="Calibri" panose="020F0502020204030204" pitchFamily="34" charset="0"/>
-            </a:endParaRPr>
           </a:p>
         </p:txBody>
       </p:sp>
@@ -13875,7 +13442,7 @@
               <a:defRPr/>
             </a:pPr>
             <a:r>
-              <a:rPr kumimoji="0" lang="en-US" altLang="ja-JP" sz="1400" b="1" kern="0" dirty="0" smtClean="0">
+              <a:rPr kumimoji="0" lang="en-US" altLang="ja-JP" sz="1400" b="1" kern="0" dirty="0">
                 <a:solidFill>
                   <a:srgbClr val="000000"/>
                 </a:solidFill>
@@ -13883,18 +13450,7 @@
                 <a:ea typeface="HG明朝E" panose="02020909000000000000" pitchFamily="17" charset="-128"/>
                 <a:cs typeface="Calibri" panose="020F0502020204030204" pitchFamily="34" charset="0"/>
               </a:rPr>
-              <a:t>Server </a:t>
-            </a:r>
-            <a:r>
-              <a:rPr kumimoji="0" lang="en-US" altLang="ja-JP" sz="1400" b="1" kern="0" dirty="0" smtClean="0">
-                <a:solidFill>
-                  <a:srgbClr val="000000"/>
-                </a:solidFill>
-                <a:latin typeface="Calibri" panose="020F0502020204030204" pitchFamily="34" charset="0"/>
-                <a:ea typeface="HG明朝E" panose="02020909000000000000" pitchFamily="17" charset="-128"/>
-                <a:cs typeface="Calibri" panose="020F0502020204030204" pitchFamily="34" charset="0"/>
-              </a:rPr>
-              <a:t>A</a:t>
+              <a:t>Server A</a:t>
             </a:r>
             <a:endParaRPr kumimoji="0" lang="en-US" altLang="ja-JP" sz="1400" b="1" i="0" u="none" strike="noStrike" kern="0" cap="none" spc="0" normalizeH="0" baseline="0" dirty="0">
               <a:ln>
@@ -14030,7 +13586,7 @@
               <a:defRPr/>
             </a:pPr>
             <a:r>
-              <a:rPr kumimoji="0" lang="en-US" altLang="ja-JP" sz="1400" b="1" kern="0" dirty="0" smtClean="0">
+              <a:rPr kumimoji="0" lang="en-US" altLang="ja-JP" sz="1400" b="1" kern="0" dirty="0">
                 <a:solidFill>
                   <a:srgbClr val="000000"/>
                 </a:solidFill>
@@ -14041,7 +13597,7 @@
               <a:t>Client </a:t>
             </a:r>
             <a:r>
-              <a:rPr kumimoji="0" lang="en-US" altLang="ja-JP" sz="1400" b="1" i="0" u="none" strike="noStrike" kern="0" cap="none" spc="0" normalizeH="0" baseline="0" dirty="0" smtClean="0">
+              <a:rPr kumimoji="0" lang="en-US" altLang="ja-JP" sz="1400" b="1" i="0" u="none" strike="noStrike" kern="0" cap="none" spc="0" normalizeH="0" baseline="0" dirty="0">
                 <a:ln>
                   <a:noFill/>
                 </a:ln>
@@ -14057,20 +13613,6 @@
               </a:rPr>
               <a:t>A</a:t>
             </a:r>
-            <a:endParaRPr kumimoji="0" lang="en-US" altLang="ja-JP" sz="1400" b="1" i="0" u="none" strike="noStrike" kern="0" cap="none" spc="0" normalizeH="0" baseline="0" dirty="0">
-              <a:ln>
-                <a:noFill/>
-              </a:ln>
-              <a:solidFill>
-                <a:srgbClr val="000000"/>
-              </a:solidFill>
-              <a:effectLst/>
-              <a:uLnTx/>
-              <a:uFillTx/>
-              <a:latin typeface="Calibri" panose="020F0502020204030204" pitchFamily="34" charset="0"/>
-              <a:ea typeface="HG明朝E" panose="02020909000000000000" pitchFamily="17" charset="-128"/>
-              <a:cs typeface="Calibri" panose="020F0502020204030204" pitchFamily="34" charset="0"/>
-            </a:endParaRPr>
           </a:p>
         </p:txBody>
       </p:sp>
@@ -14128,7 +13670,7 @@
               <a:defRPr/>
             </a:pPr>
             <a:r>
-              <a:rPr lang="en-US" altLang="ja-JP" sz="1100" kern="0" dirty="0" err="1" smtClean="0">
+              <a:rPr lang="en-US" altLang="ja-JP" sz="1100" kern="0" dirty="0" err="1">
                 <a:solidFill>
                   <a:prstClr val="white"/>
                 </a:solidFill>
@@ -14203,7 +13745,7 @@
               <a:defRPr/>
             </a:pPr>
             <a:r>
-              <a:rPr lang="en-US" altLang="ja-JP" sz="1100" kern="0" dirty="0" err="1" smtClean="0">
+              <a:rPr lang="en-US" altLang="ja-JP" sz="1100" kern="0" dirty="0" err="1">
                 <a:solidFill>
                   <a:prstClr val="white"/>
                 </a:solidFill>
@@ -14278,7 +13820,7 @@
               <a:defRPr/>
             </a:pPr>
             <a:r>
-              <a:rPr lang="en-US" altLang="ja-JP" sz="1100" kern="0" dirty="0" err="1" smtClean="0">
+              <a:rPr lang="en-US" altLang="ja-JP" sz="1100" kern="0" dirty="0" err="1">
                 <a:solidFill>
                   <a:prstClr val="white"/>
                 </a:solidFill>
@@ -14353,7 +13895,7 @@
               <a:defRPr/>
             </a:pPr>
             <a:r>
-              <a:rPr lang="en-US" altLang="ja-JP" sz="1100" kern="0" dirty="0" err="1" smtClean="0">
+              <a:rPr lang="en-US" altLang="ja-JP" sz="1100" kern="0" dirty="0" err="1">
                 <a:solidFill>
                   <a:prstClr val="white"/>
                 </a:solidFill>
@@ -14490,96 +14032,6 @@
             <a:endParaRPr lang="en-US" sz="2000">
               <a:latin typeface="+mj-lt"/>
               <a:cs typeface="Arial" pitchFamily="34" charset="0"/>
-            </a:endParaRPr>
-          </a:p>
-        </p:txBody>
-      </p:sp>
-      <p:sp>
-        <p:nvSpPr>
-          <p:cNvPr id="116" name="角丸四角形 6">
-            <a:extLst>
-              <a:ext uri="{FF2B5EF4-FFF2-40B4-BE49-F238E27FC236}">
-                <a16:creationId xmlns:a16="http://schemas.microsoft.com/office/drawing/2014/main" id="{07963EC9-8D4B-41E4-BC85-A0448AE81D2D}"/>
-              </a:ext>
-            </a:extLst>
-          </p:cNvPr>
-          <p:cNvSpPr/>
-          <p:nvPr/>
-        </p:nvSpPr>
-        <p:spPr bwMode="auto">
-          <a:xfrm flipH="1">
-            <a:off x="4854610" y="1768486"/>
-            <a:ext cx="1229557" cy="547242"/>
-          </a:xfrm>
-          <a:prstGeom prst="roundRect">
-            <a:avLst>
-              <a:gd name="adj" fmla="val 4472"/>
-            </a:avLst>
-          </a:prstGeom>
-          <a:ln>
-            <a:headEnd type="none" w="med" len="med"/>
-            <a:tailEnd type="none" w="med" len="med"/>
-          </a:ln>
-          <a:extLst/>
-        </p:spPr>
-        <p:style>
-          <a:lnRef idx="2">
-            <a:schemeClr val="dk1"/>
-          </a:lnRef>
-          <a:fillRef idx="1">
-            <a:schemeClr val="lt1"/>
-          </a:fillRef>
-          <a:effectRef idx="0">
-            <a:schemeClr val="dk1"/>
-          </a:effectRef>
-          <a:fontRef idx="minor">
-            <a:schemeClr val="dk1"/>
-          </a:fontRef>
-        </p:style>
-        <p:txBody>
-          <a:bodyPr vert="horz" wrap="none" lIns="0" tIns="0" rIns="0" bIns="0" numCol="1" rtlCol="0" anchor="ctr" anchorCtr="0" compatLnSpc="1">
-            <a:prstTxWarp prst="textNoShape">
-              <a:avLst/>
-            </a:prstTxWarp>
-            <a:noAutofit/>
-          </a:bodyPr>
-          <a:lstStyle/>
-          <a:p>
-            <a:pPr marL="0" marR="0" lvl="0" indent="0" algn="ctr" defTabSz="914400" eaLnBrk="1" fontAlgn="ctr" latinLnBrk="0" hangingPunct="1">
-              <a:lnSpc>
-                <a:spcPct val="75000"/>
-              </a:lnSpc>
-              <a:spcBef>
-                <a:spcPts val="0"/>
-              </a:spcBef>
-              <a:spcAft>
-                <a:spcPts val="0"/>
-              </a:spcAft>
-              <a:buClrTx/>
-              <a:buSzTx/>
-              <a:buFontTx/>
-              <a:buNone/>
-              <a:tabLst/>
-              <a:defRPr/>
-            </a:pPr>
-            <a:r>
-              <a:rPr kumimoji="0" lang="en-US" altLang="ja-JP" sz="1400" b="1" kern="0" dirty="0" smtClean="0">
-                <a:solidFill>
-                  <a:srgbClr val="000000"/>
-                </a:solidFill>
-                <a:latin typeface="Calibri" panose="020F0502020204030204" pitchFamily="34" charset="0"/>
-                <a:ea typeface="HG明朝E" panose="02020909000000000000" pitchFamily="17" charset="-128"/>
-                <a:cs typeface="Calibri" panose="020F0502020204030204" pitchFamily="34" charset="0"/>
-              </a:rPr>
-              <a:t>Thing Directory</a:t>
-            </a:r>
-            <a:endParaRPr kumimoji="0" lang="en-US" altLang="ja-JP" sz="1400" b="1" kern="0" dirty="0">
-              <a:solidFill>
-                <a:srgbClr val="000000"/>
-              </a:solidFill>
-              <a:latin typeface="Calibri" panose="020F0502020204030204" pitchFamily="34" charset="0"/>
-              <a:ea typeface="HG明朝E" panose="02020909000000000000" pitchFamily="17" charset="-128"/>
-              <a:cs typeface="Calibri" panose="020F0502020204030204" pitchFamily="34" charset="0"/>
             </a:endParaRPr>
           </a:p>
         </p:txBody>
@@ -14653,7 +14105,7 @@
               <a:defRPr/>
             </a:pPr>
             <a:r>
-              <a:rPr kumimoji="0" lang="en-US" altLang="ja-JP" sz="1400" b="1" kern="0" dirty="0" smtClean="0">
+              <a:rPr kumimoji="0" lang="en-US" altLang="ja-JP" sz="1400" b="1" kern="0" dirty="0">
                 <a:solidFill>
                   <a:srgbClr val="000000"/>
                 </a:solidFill>
@@ -14663,14 +14115,6 @@
               </a:rPr>
               <a:t>Remote</a:t>
             </a:r>
-            <a:endParaRPr kumimoji="0" lang="en-US" altLang="ja-JP" sz="1400" b="1" kern="0" dirty="0">
-              <a:solidFill>
-                <a:srgbClr val="000000"/>
-              </a:solidFill>
-              <a:latin typeface="Calibri" panose="020F0502020204030204" pitchFamily="34" charset="0"/>
-              <a:ea typeface="HG明朝E" panose="02020909000000000000" pitchFamily="17" charset="-128"/>
-              <a:cs typeface="Calibri" panose="020F0502020204030204" pitchFamily="34" charset="0"/>
-            </a:endParaRPr>
           </a:p>
           <a:p>
             <a:pPr marL="0" marR="0" lvl="0" indent="0" algn="ctr" defTabSz="914400" eaLnBrk="1" fontAlgn="ctr" latinLnBrk="0" hangingPunct="1">
@@ -14691,7 +14135,7 @@
               <a:defRPr/>
             </a:pPr>
             <a:r>
-              <a:rPr kumimoji="0" lang="en-US" altLang="ja-JP" sz="1400" b="1" i="0" u="none" strike="noStrike" kern="0" cap="none" spc="0" normalizeH="0" baseline="0" dirty="0" smtClean="0">
+              <a:rPr kumimoji="0" lang="en-US" altLang="ja-JP" sz="1400" b="1" i="0" u="none" strike="noStrike" kern="0" cap="none" spc="0" normalizeH="0" baseline="0" dirty="0">
                 <a:ln>
                   <a:noFill/>
                 </a:ln>
@@ -14707,20 +14151,6 @@
               </a:rPr>
               <a:t>Servient B</a:t>
             </a:r>
-            <a:endParaRPr kumimoji="0" lang="en-US" altLang="ja-JP" sz="1400" b="1" i="0" u="none" strike="noStrike" kern="0" cap="none" spc="0" normalizeH="0" baseline="0" dirty="0">
-              <a:ln>
-                <a:noFill/>
-              </a:ln>
-              <a:solidFill>
-                <a:srgbClr val="000000"/>
-              </a:solidFill>
-              <a:effectLst/>
-              <a:uLnTx/>
-              <a:uFillTx/>
-              <a:latin typeface="Calibri" panose="020F0502020204030204" pitchFamily="34" charset="0"/>
-              <a:ea typeface="HG明朝E" panose="02020909000000000000" pitchFamily="17" charset="-128"/>
-              <a:cs typeface="Calibri" panose="020F0502020204030204" pitchFamily="34" charset="0"/>
-            </a:endParaRPr>
           </a:p>
         </p:txBody>
       </p:sp>
@@ -14778,7 +14208,7 @@
               <a:defRPr/>
             </a:pPr>
             <a:r>
-              <a:rPr lang="en-US" altLang="ja-JP" sz="1100" kern="0" dirty="0" err="1" smtClean="0">
+              <a:rPr lang="en-US" altLang="ja-JP" sz="1100" kern="0" dirty="0" err="1">
                 <a:solidFill>
                   <a:prstClr val="white"/>
                 </a:solidFill>
@@ -14853,7 +14283,7 @@
               <a:defRPr/>
             </a:pPr>
             <a:r>
-              <a:rPr lang="en-US" altLang="ja-JP" sz="1100" kern="0" dirty="0" err="1" smtClean="0">
+              <a:rPr lang="en-US" altLang="ja-JP" sz="1100" kern="0" dirty="0" err="1">
                 <a:solidFill>
                   <a:prstClr val="white"/>
                 </a:solidFill>
@@ -15038,7 +14468,7 @@
               <a:defRPr/>
             </a:pPr>
             <a:r>
-              <a:rPr kumimoji="0" lang="en-US" altLang="ja-JP" sz="1400" b="1" kern="0" dirty="0" smtClean="0">
+              <a:rPr kumimoji="0" lang="en-US" altLang="ja-JP" sz="1400" b="1" kern="0" dirty="0">
                 <a:solidFill>
                   <a:srgbClr val="000000"/>
                 </a:solidFill>
@@ -15048,14 +14478,6 @@
               </a:rPr>
               <a:t>Local</a:t>
             </a:r>
-            <a:endParaRPr kumimoji="0" lang="en-US" altLang="ja-JP" sz="1400" b="1" kern="0" dirty="0">
-              <a:solidFill>
-                <a:srgbClr val="000000"/>
-              </a:solidFill>
-              <a:latin typeface="Calibri" panose="020F0502020204030204" pitchFamily="34" charset="0"/>
-              <a:ea typeface="HG明朝E" panose="02020909000000000000" pitchFamily="17" charset="-128"/>
-              <a:cs typeface="Calibri" panose="020F0502020204030204" pitchFamily="34" charset="0"/>
-            </a:endParaRPr>
           </a:p>
           <a:p>
             <a:pPr marL="0" marR="0" lvl="0" indent="0" algn="ctr" defTabSz="914400" eaLnBrk="1" fontAlgn="ctr" latinLnBrk="0" hangingPunct="1">
@@ -15076,7 +14498,7 @@
               <a:defRPr/>
             </a:pPr>
             <a:r>
-              <a:rPr kumimoji="0" lang="en-US" altLang="ja-JP" sz="1400" b="1" i="0" u="none" strike="noStrike" kern="0" cap="none" spc="0" normalizeH="0" baseline="0" dirty="0" smtClean="0">
+              <a:rPr kumimoji="0" lang="en-US" altLang="ja-JP" sz="1400" b="1" i="0" u="none" strike="noStrike" kern="0" cap="none" spc="0" normalizeH="0" baseline="0" dirty="0">
                 <a:ln>
                   <a:noFill/>
                 </a:ln>
@@ -15092,20 +14514,6 @@
               </a:rPr>
               <a:t>Servient B</a:t>
             </a:r>
-            <a:endParaRPr kumimoji="0" lang="en-US" altLang="ja-JP" sz="1400" b="1" i="0" u="none" strike="noStrike" kern="0" cap="none" spc="0" normalizeH="0" baseline="0" dirty="0">
-              <a:ln>
-                <a:noFill/>
-              </a:ln>
-              <a:solidFill>
-                <a:srgbClr val="000000"/>
-              </a:solidFill>
-              <a:effectLst/>
-              <a:uLnTx/>
-              <a:uFillTx/>
-              <a:latin typeface="Calibri" panose="020F0502020204030204" pitchFamily="34" charset="0"/>
-              <a:ea typeface="HG明朝E" panose="02020909000000000000" pitchFamily="17" charset="-128"/>
-              <a:cs typeface="Calibri" panose="020F0502020204030204" pitchFamily="34" charset="0"/>
-            </a:endParaRPr>
           </a:p>
         </p:txBody>
       </p:sp>
@@ -15178,7 +14586,7 @@
               <a:defRPr/>
             </a:pPr>
             <a:r>
-              <a:rPr kumimoji="0" lang="en-US" altLang="ja-JP" sz="1400" b="1" kern="0" dirty="0" smtClean="0">
+              <a:rPr kumimoji="0" lang="en-US" altLang="ja-JP" sz="1400" b="1" kern="0" dirty="0">
                 <a:solidFill>
                   <a:srgbClr val="000000"/>
                 </a:solidFill>
@@ -15322,7 +14730,7 @@
               <a:defRPr/>
             </a:pPr>
             <a:r>
-              <a:rPr kumimoji="0" lang="en-US" altLang="ja-JP" sz="1400" b="1" kern="0" dirty="0" smtClean="0">
+              <a:rPr kumimoji="0" lang="en-US" altLang="ja-JP" sz="1400" b="1" kern="0" dirty="0">
                 <a:solidFill>
                   <a:srgbClr val="000000"/>
                 </a:solidFill>
@@ -15333,7 +14741,7 @@
               <a:t>Client </a:t>
             </a:r>
             <a:r>
-              <a:rPr kumimoji="0" lang="en-US" altLang="ja-JP" sz="1400" b="1" i="0" u="none" strike="noStrike" kern="0" cap="none" spc="0" normalizeH="0" baseline="0" dirty="0" smtClean="0">
+              <a:rPr kumimoji="0" lang="en-US" altLang="ja-JP" sz="1400" b="1" i="0" u="none" strike="noStrike" kern="0" cap="none" spc="0" normalizeH="0" baseline="0" dirty="0">
                 <a:ln>
                   <a:noFill/>
                 </a:ln>
@@ -15349,20 +14757,6 @@
               </a:rPr>
               <a:t>B</a:t>
             </a:r>
-            <a:endParaRPr kumimoji="0" lang="en-US" altLang="ja-JP" sz="1400" b="1" i="0" u="none" strike="noStrike" kern="0" cap="none" spc="0" normalizeH="0" baseline="0" dirty="0">
-              <a:ln>
-                <a:noFill/>
-              </a:ln>
-              <a:solidFill>
-                <a:srgbClr val="000000"/>
-              </a:solidFill>
-              <a:effectLst/>
-              <a:uLnTx/>
-              <a:uFillTx/>
-              <a:latin typeface="Calibri" panose="020F0502020204030204" pitchFamily="34" charset="0"/>
-              <a:ea typeface="HG明朝E" panose="02020909000000000000" pitchFamily="17" charset="-128"/>
-              <a:cs typeface="Calibri" panose="020F0502020204030204" pitchFamily="34" charset="0"/>
-            </a:endParaRPr>
           </a:p>
         </p:txBody>
       </p:sp>
@@ -15420,7 +14814,7 @@
               <a:defRPr/>
             </a:pPr>
             <a:r>
-              <a:rPr lang="en-US" altLang="ja-JP" sz="1100" kern="0" dirty="0" err="1" smtClean="0">
+              <a:rPr lang="en-US" altLang="ja-JP" sz="1100" kern="0" dirty="0" err="1">
                 <a:solidFill>
                   <a:prstClr val="white"/>
                 </a:solidFill>
@@ -15495,7 +14889,7 @@
               <a:defRPr/>
             </a:pPr>
             <a:r>
-              <a:rPr lang="en-US" altLang="ja-JP" sz="1100" kern="0" dirty="0" err="1" smtClean="0">
+              <a:rPr lang="en-US" altLang="ja-JP" sz="1100" kern="0" dirty="0" err="1">
                 <a:solidFill>
                   <a:prstClr val="white"/>
                 </a:solidFill>
@@ -15570,7 +14964,7 @@
               <a:defRPr/>
             </a:pPr>
             <a:r>
-              <a:rPr lang="en-US" altLang="ja-JP" sz="1100" kern="0" dirty="0" err="1" smtClean="0">
+              <a:rPr lang="en-US" altLang="ja-JP" sz="1100" kern="0" dirty="0" err="1">
                 <a:solidFill>
                   <a:prstClr val="white"/>
                 </a:solidFill>
@@ -15645,7 +15039,7 @@
               <a:defRPr/>
             </a:pPr>
             <a:r>
-              <a:rPr lang="en-US" altLang="ja-JP" sz="1100" kern="0" dirty="0" err="1" smtClean="0">
+              <a:rPr lang="en-US" altLang="ja-JP" sz="1100" kern="0" dirty="0" err="1">
                 <a:solidFill>
                   <a:prstClr val="white"/>
                 </a:solidFill>
@@ -15921,6 +15315,170 @@
           </a:fontRef>
         </p:style>
       </p:cxnSp>
+      <p:sp>
+        <p:nvSpPr>
+          <p:cNvPr id="46" name="角丸四角形 6">
+            <a:extLst>
+              <a:ext uri="{FF2B5EF4-FFF2-40B4-BE49-F238E27FC236}">
+                <a16:creationId xmlns:a16="http://schemas.microsoft.com/office/drawing/2014/main" id="{F9EC7D46-545B-4302-8FD9-D57EA2F17072}"/>
+              </a:ext>
+            </a:extLst>
+          </p:cNvPr>
+          <p:cNvSpPr/>
+          <p:nvPr/>
+        </p:nvSpPr>
+        <p:spPr bwMode="auto">
+          <a:xfrm>
+            <a:off x="2710355" y="1772816"/>
+            <a:ext cx="1423474" cy="547242"/>
+          </a:xfrm>
+          <a:prstGeom prst="roundRect">
+            <a:avLst>
+              <a:gd name="adj" fmla="val 4472"/>
+            </a:avLst>
+          </a:prstGeom>
+          <a:ln>
+            <a:headEnd type="none" w="med" len="med"/>
+            <a:tailEnd type="none" w="med" len="med"/>
+          </a:ln>
+          <a:extLst/>
+        </p:spPr>
+        <p:style>
+          <a:lnRef idx="2">
+            <a:schemeClr val="dk1"/>
+          </a:lnRef>
+          <a:fillRef idx="1">
+            <a:schemeClr val="lt1"/>
+          </a:fillRef>
+          <a:effectRef idx="0">
+            <a:schemeClr val="dk1"/>
+          </a:effectRef>
+          <a:fontRef idx="minor">
+            <a:schemeClr val="dk1"/>
+          </a:fontRef>
+        </p:style>
+        <p:txBody>
+          <a:bodyPr vert="horz" wrap="none" lIns="0" tIns="0" rIns="0" bIns="0" numCol="1" rtlCol="0" anchor="ctr" anchorCtr="0" compatLnSpc="1">
+            <a:prstTxWarp prst="textNoShape">
+              <a:avLst/>
+            </a:prstTxWarp>
+            <a:noAutofit/>
+          </a:bodyPr>
+          <a:lstStyle/>
+          <a:p>
+            <a:pPr marL="0" marR="0" lvl="0" indent="0" algn="ctr" defTabSz="914400" eaLnBrk="1" fontAlgn="ctr" latinLnBrk="0" hangingPunct="1">
+              <a:lnSpc>
+                <a:spcPct val="75000"/>
+              </a:lnSpc>
+              <a:spcBef>
+                <a:spcPts val="0"/>
+              </a:spcBef>
+              <a:spcAft>
+                <a:spcPts val="0"/>
+              </a:spcAft>
+              <a:buClrTx/>
+              <a:buSzTx/>
+              <a:buFontTx/>
+              <a:buNone/>
+              <a:tabLst/>
+              <a:defRPr/>
+            </a:pPr>
+            <a:r>
+              <a:rPr kumimoji="0" lang="en-US" altLang="ja-JP" sz="1400" b="1" kern="0" dirty="0">
+                <a:solidFill>
+                  <a:srgbClr val="000000"/>
+                </a:solidFill>
+                <a:latin typeface="Calibri" panose="020F0502020204030204" pitchFamily="34" charset="0"/>
+                <a:ea typeface="HG明朝E" panose="02020909000000000000" pitchFamily="17" charset="-128"/>
+                <a:cs typeface="Calibri" panose="020F0502020204030204" pitchFamily="34" charset="0"/>
+              </a:rPr>
+              <a:t>Thing Directory A</a:t>
+            </a:r>
+          </a:p>
+        </p:txBody>
+      </p:sp>
+      <p:sp>
+        <p:nvSpPr>
+          <p:cNvPr id="47" name="角丸四角形 6">
+            <a:extLst>
+              <a:ext uri="{FF2B5EF4-FFF2-40B4-BE49-F238E27FC236}">
+                <a16:creationId xmlns:a16="http://schemas.microsoft.com/office/drawing/2014/main" id="{E64A46FD-1548-4B15-B5A5-5AEF5F247A94}"/>
+              </a:ext>
+            </a:extLst>
+          </p:cNvPr>
+          <p:cNvSpPr/>
+          <p:nvPr/>
+        </p:nvSpPr>
+        <p:spPr bwMode="auto">
+          <a:xfrm flipH="1">
+            <a:off x="4863609" y="1772816"/>
+            <a:ext cx="1423474" cy="547242"/>
+          </a:xfrm>
+          <a:prstGeom prst="roundRect">
+            <a:avLst>
+              <a:gd name="adj" fmla="val 4472"/>
+            </a:avLst>
+          </a:prstGeom>
+          <a:ln>
+            <a:headEnd type="none" w="med" len="med"/>
+            <a:tailEnd type="none" w="med" len="med"/>
+          </a:ln>
+          <a:extLst/>
+        </p:spPr>
+        <p:style>
+          <a:lnRef idx="2">
+            <a:schemeClr val="dk1"/>
+          </a:lnRef>
+          <a:fillRef idx="1">
+            <a:schemeClr val="lt1"/>
+          </a:fillRef>
+          <a:effectRef idx="0">
+            <a:schemeClr val="dk1"/>
+          </a:effectRef>
+          <a:fontRef idx="minor">
+            <a:schemeClr val="dk1"/>
+          </a:fontRef>
+        </p:style>
+        <p:txBody>
+          <a:bodyPr vert="horz" wrap="none" lIns="0" tIns="0" rIns="0" bIns="0" numCol="1" rtlCol="0" anchor="ctr" anchorCtr="0" compatLnSpc="1">
+            <a:prstTxWarp prst="textNoShape">
+              <a:avLst/>
+            </a:prstTxWarp>
+            <a:noAutofit/>
+          </a:bodyPr>
+          <a:lstStyle/>
+          <a:p>
+            <a:pPr marL="0" marR="0" lvl="0" indent="0" algn="ctr" defTabSz="914400" eaLnBrk="1" fontAlgn="ctr" latinLnBrk="0" hangingPunct="1">
+              <a:lnSpc>
+                <a:spcPct val="75000"/>
+              </a:lnSpc>
+              <a:spcBef>
+                <a:spcPts val="0"/>
+              </a:spcBef>
+              <a:spcAft>
+                <a:spcPts val="0"/>
+              </a:spcAft>
+              <a:buClrTx/>
+              <a:buSzTx/>
+              <a:buFontTx/>
+              <a:buNone/>
+              <a:tabLst/>
+              <a:defRPr/>
+            </a:pPr>
+            <a:r>
+              <a:rPr kumimoji="0" lang="en-US" altLang="ja-JP" sz="1400" b="1" kern="0" dirty="0">
+                <a:solidFill>
+                  <a:srgbClr val="000000"/>
+                </a:solidFill>
+                <a:latin typeface="Calibri" panose="020F0502020204030204" pitchFamily="34" charset="0"/>
+                <a:ea typeface="HG明朝E" panose="02020909000000000000" pitchFamily="17" charset="-128"/>
+                <a:cs typeface="Calibri" panose="020F0502020204030204" pitchFamily="34" charset="0"/>
+              </a:rPr>
+              <a:t>Thing Directory B</a:t>
+            </a:r>
+          </a:p>
+        </p:txBody>
+      </p:sp>
     </p:spTree>
     <p:extLst>
       <p:ext uri="{BB962C8B-B14F-4D97-AF65-F5344CB8AC3E}">
@@ -21431,7 +20989,7 @@
               <a:defRPr/>
             </a:pPr>
             <a:r>
-              <a:rPr kumimoji="0" lang="en-US" altLang="ja-JP" sz="1000" b="1" i="0" u="none" strike="noStrike" kern="0" cap="none" spc="0" normalizeH="0" baseline="0" dirty="0" smtClean="0">
+              <a:rPr kumimoji="0" lang="en-US" altLang="ja-JP" sz="1000" b="1" i="0" u="none" strike="noStrike" kern="0" cap="none" spc="0" normalizeH="0" baseline="0" dirty="0">
                 <a:ln>
                   <a:noFill/>
                 </a:ln>
@@ -21474,24 +21032,23 @@
           <a:p>
             <a:pPr algn="ctr"/>
             <a:r>
-              <a:rPr lang="en-US" sz="1200" b="1" dirty="0" smtClean="0"/>
+              <a:rPr lang="en-US" sz="1200" b="1" dirty="0"/>
               <a:t>Direct</a:t>
             </a:r>
             <a:br>
-              <a:rPr lang="en-US" sz="1200" b="1" dirty="0" smtClean="0"/>
+              <a:rPr lang="en-US" sz="1200" b="1" dirty="0"/>
             </a:br>
             <a:r>
-              <a:rPr lang="en-US" sz="1200" b="1" dirty="0" smtClean="0"/>
+              <a:rPr lang="en-US" sz="1200" b="1" dirty="0"/>
               <a:t>Thing-to-Thing</a:t>
             </a:r>
           </a:p>
           <a:p>
             <a:pPr algn="ctr"/>
             <a:r>
-              <a:rPr lang="en-US" sz="1200" b="1" dirty="0" smtClean="0"/>
+              <a:rPr lang="en-US" sz="1200" b="1" dirty="0"/>
               <a:t>Interaction</a:t>
             </a:r>
-            <a:endParaRPr lang="en-US" sz="1200" b="1" dirty="0"/>
           </a:p>
         </p:txBody>
       </p:sp>
@@ -21558,7 +21115,7 @@
               <a:defRPr/>
             </a:pPr>
             <a:r>
-              <a:rPr kumimoji="0" lang="en-US" altLang="ja-JP" sz="1000" b="1" i="0" u="none" strike="noStrike" kern="0" cap="none" spc="0" normalizeH="0" baseline="0" dirty="0" smtClean="0">
+              <a:rPr kumimoji="0" lang="en-US" altLang="ja-JP" sz="1000" b="1" i="0" u="none" strike="noStrike" kern="0" cap="none" spc="0" normalizeH="0" baseline="0" dirty="0">
                 <a:ln>
                   <a:noFill/>
                 </a:ln>
@@ -21642,14 +21199,14 @@
           <a:p>
             <a:pPr algn="ctr"/>
             <a:r>
-              <a:rPr lang="en-US" sz="1200" b="1" dirty="0" smtClean="0"/>
+              <a:rPr lang="en-US" sz="1200" b="1" dirty="0"/>
               <a:t>Complement</a:t>
             </a:r>
             <a:br>
-              <a:rPr lang="en-US" sz="1200" b="1" dirty="0" smtClean="0"/>
+              <a:rPr lang="en-US" sz="1200" b="1" dirty="0"/>
             </a:br>
             <a:r>
-              <a:rPr lang="en-US" sz="1200" b="1" dirty="0" smtClean="0"/>
+              <a:rPr lang="en-US" sz="1200" b="1" dirty="0"/>
               <a:t>Existing Devices</a:t>
             </a:r>
           </a:p>
@@ -21718,7 +21275,7 @@
               <a:defRPr/>
             </a:pPr>
             <a:r>
-              <a:rPr kumimoji="0" lang="en-US" altLang="ja-JP" sz="1000" b="1" i="0" u="none" strike="noStrike" kern="0" cap="none" spc="0" normalizeH="0" baseline="0" dirty="0" smtClean="0">
+              <a:rPr kumimoji="0" lang="en-US" altLang="ja-JP" sz="1000" b="1" i="0" u="none" strike="noStrike" kern="0" cap="none" spc="0" normalizeH="0" baseline="0" dirty="0">
                 <a:ln>
                   <a:noFill/>
                 </a:ln>
@@ -22047,7 +21604,7 @@
               <a:defRPr/>
             </a:pPr>
             <a:r>
-              <a:rPr kumimoji="0" lang="en-US" altLang="ja-JP" sz="1000" b="1" i="0" u="none" strike="noStrike" kern="0" cap="none" spc="0" normalizeH="0" baseline="0" smtClean="0">
+              <a:rPr kumimoji="0" lang="en-US" altLang="ja-JP" sz="1000" b="1" i="0" u="none" strike="noStrike" kern="0" cap="none" spc="0" normalizeH="0" baseline="0">
                 <a:ln>
                   <a:noFill/>
                 </a:ln>
@@ -22119,10 +21676,9 @@
           <a:lstStyle/>
           <a:p>
             <a:r>
-              <a:rPr lang="en-US" sz="1200" b="1" smtClean="0"/>
+              <a:rPr lang="en-US" sz="1200" b="1"/>
               <a:t>Web Integration</a:t>
             </a:r>
-            <a:endParaRPr lang="en-US" sz="1200" b="1"/>
           </a:p>
         </p:txBody>
       </p:sp>
@@ -22164,7 +21720,7 @@
           <a:p>
             <a:pPr algn="ctr"/>
             <a:r>
-              <a:rPr lang="en-US" altLang="ja-JP" sz="1400" dirty="0" smtClean="0"/>
+              <a:rPr lang="en-US" altLang="ja-JP" sz="1400" dirty="0"/>
               <a:t>server</a:t>
             </a:r>
             <a:endParaRPr kumimoji="1" lang="ja-JP" altLang="en-US" sz="1400" dirty="0"/>
@@ -22207,7 +21763,7 @@
           <a:p>
             <a:pPr algn="ctr"/>
             <a:r>
-              <a:rPr lang="en-US" altLang="ja-JP" sz="1400" dirty="0" smtClean="0"/>
+              <a:rPr lang="en-US" altLang="ja-JP" sz="1400" dirty="0"/>
               <a:t>client</a:t>
             </a:r>
             <a:endParaRPr kumimoji="1" lang="ja-JP" altLang="en-US" sz="1400" dirty="0"/>
@@ -22250,7 +21806,7 @@
           <a:p>
             <a:pPr algn="ctr"/>
             <a:r>
-              <a:rPr lang="en-US" altLang="ja-JP" sz="1400" dirty="0" smtClean="0"/>
+              <a:rPr lang="en-US" altLang="ja-JP" sz="1400" dirty="0"/>
               <a:t>server</a:t>
             </a:r>
             <a:endParaRPr kumimoji="1" lang="ja-JP" altLang="en-US" sz="1400" dirty="0"/>
@@ -22293,7 +21849,7 @@
           <a:p>
             <a:pPr algn="ctr"/>
             <a:r>
-              <a:rPr lang="en-US" altLang="ja-JP" sz="1400" dirty="0" smtClean="0"/>
+              <a:rPr lang="en-US" altLang="ja-JP" sz="1400" dirty="0"/>
               <a:t>server</a:t>
             </a:r>
             <a:endParaRPr kumimoji="1" lang="ja-JP" altLang="en-US" sz="1400" dirty="0"/>
@@ -22324,7 +21880,7 @@
           <a:p>
             <a:pPr algn="ctr"/>
             <a:r>
-              <a:rPr lang="en-US" sz="1200" b="1" dirty="0" smtClean="0"/>
+              <a:rPr lang="en-US" sz="1200" b="1" dirty="0"/>
               <a:t>Integration and Orchestration</a:t>
             </a:r>
           </a:p>
@@ -22354,7 +21910,7 @@
           <a:p>
             <a:pPr algn="ctr"/>
             <a:r>
-              <a:rPr lang="en-US" sz="1200" b="1" dirty="0" smtClean="0"/>
+              <a:rPr lang="en-US" sz="1200" b="1" dirty="0"/>
               <a:t>Remote access and Synchronization</a:t>
             </a:r>
           </a:p>
@@ -22470,7 +22026,7 @@
           <a:p>
             <a:pPr algn="ctr"/>
             <a:r>
-              <a:rPr lang="en-US" altLang="ja-JP" sz="1400" dirty="0" smtClean="0"/>
+              <a:rPr lang="en-US" altLang="ja-JP" sz="1400" dirty="0"/>
               <a:t>client</a:t>
             </a:r>
             <a:endParaRPr kumimoji="1" lang="ja-JP" altLang="en-US" sz="1400" dirty="0"/>
@@ -22540,7 +22096,7 @@
               <a:defRPr/>
             </a:pPr>
             <a:r>
-              <a:rPr kumimoji="0" lang="en-US" altLang="ja-JP" sz="1000" b="1" kern="0" dirty="0" smtClean="0">
+              <a:rPr kumimoji="0" lang="en-US" altLang="ja-JP" sz="1000" b="1" kern="0" dirty="0">
                 <a:solidFill>
                   <a:srgbClr val="000000"/>
                 </a:solidFill>
@@ -22550,7 +22106,7 @@
               </a:rPr>
               <a:t>Gateway</a:t>
             </a:r>
-            <a:endParaRPr kumimoji="0" lang="en-US" altLang="ja-JP" sz="1000" b="1" i="0" u="none" strike="noStrike" kern="0" cap="none" spc="0" normalizeH="0" baseline="0" dirty="0" smtClean="0">
+            <a:endParaRPr kumimoji="0" lang="en-US" altLang="ja-JP" sz="1000" b="1" i="0" u="none" strike="noStrike" kern="0" cap="none" spc="0" normalizeH="0" baseline="0" dirty="0">
               <a:ln>
                 <a:noFill/>
               </a:ln>
@@ -22640,7 +22196,7 @@
           <a:p>
             <a:pPr algn="ctr"/>
             <a:r>
-              <a:rPr lang="en-US" altLang="ja-JP" sz="1400" dirty="0" smtClean="0"/>
+              <a:rPr lang="en-US" altLang="ja-JP" sz="1400" dirty="0"/>
               <a:t>client</a:t>
             </a:r>
             <a:endParaRPr kumimoji="1" lang="ja-JP" altLang="en-US" sz="1400" dirty="0"/>
@@ -22683,7 +22239,7 @@
           <a:p>
             <a:pPr algn="ctr"/>
             <a:r>
-              <a:rPr lang="en-US" altLang="ja-JP" sz="1400" dirty="0" smtClean="0"/>
+              <a:rPr lang="en-US" altLang="ja-JP" sz="1400" dirty="0"/>
               <a:t>Proxy/ gateway</a:t>
             </a:r>
             <a:endParaRPr kumimoji="1" lang="ja-JP" altLang="en-US" sz="1400" dirty="0"/>
@@ -22894,7 +22450,7 @@
               <a:defRPr/>
             </a:pPr>
             <a:r>
-              <a:rPr kumimoji="0" lang="en-US" altLang="ja-JP" sz="1000" b="1" kern="0" dirty="0" smtClean="0">
+              <a:rPr kumimoji="0" lang="en-US" altLang="ja-JP" sz="1000" b="1" kern="0" dirty="0">
                 <a:solidFill>
                   <a:srgbClr val="000000"/>
                 </a:solidFill>
@@ -22904,7 +22460,7 @@
               </a:rPr>
               <a:t>Cloud</a:t>
             </a:r>
-            <a:endParaRPr kumimoji="0" lang="en-US" altLang="ja-JP" sz="1000" b="1" i="0" u="none" strike="noStrike" kern="0" cap="none" spc="0" normalizeH="0" baseline="0" dirty="0" smtClean="0">
+            <a:endParaRPr kumimoji="0" lang="en-US" altLang="ja-JP" sz="1000" b="1" i="0" u="none" strike="noStrike" kern="0" cap="none" spc="0" normalizeH="0" baseline="0" dirty="0">
               <a:ln>
                 <a:noFill/>
               </a:ln>
@@ -22957,7 +22513,7 @@
           <a:p>
             <a:pPr algn="ctr"/>
             <a:r>
-              <a:rPr lang="en-US" altLang="ja-JP" sz="1400" dirty="0" smtClean="0"/>
+              <a:rPr lang="en-US" altLang="ja-JP" sz="1400" dirty="0"/>
               <a:t>client</a:t>
             </a:r>
             <a:endParaRPr kumimoji="1" lang="ja-JP" altLang="en-US" sz="1400" dirty="0"/>
@@ -23000,7 +22556,7 @@
           <a:p>
             <a:pPr algn="ctr"/>
             <a:r>
-              <a:rPr lang="en-US" altLang="ja-JP" sz="1400" dirty="0" smtClean="0"/>
+              <a:rPr lang="en-US" altLang="ja-JP" sz="1400" dirty="0"/>
               <a:t>proxy</a:t>
             </a:r>
             <a:endParaRPr kumimoji="1" lang="ja-JP" altLang="en-US" sz="1400" dirty="0"/>
@@ -23435,10 +22991,9 @@
           <a:lstStyle/>
           <a:p>
             <a:r>
-              <a:rPr lang="en-US" dirty="0" smtClean="0"/>
+              <a:rPr lang="en-US" dirty="0"/>
               <a:t>3.3 Summary</a:t>
             </a:r>
-            <a:endParaRPr lang="en-US" dirty="0"/>
           </a:p>
         </p:txBody>
       </p:sp>
@@ -23546,7 +23101,7 @@
               <a:defRPr/>
             </a:pPr>
             <a:r>
-              <a:rPr kumimoji="0" lang="en-US" altLang="ja-JP" sz="1000" b="1" i="0" u="none" strike="noStrike" kern="0" cap="none" spc="0" normalizeH="0" baseline="0" dirty="0" smtClean="0">
+              <a:rPr kumimoji="0" lang="en-US" altLang="ja-JP" sz="1000" b="1" i="0" u="none" strike="noStrike" kern="0" cap="none" spc="0" normalizeH="0" baseline="0" dirty="0">
                 <a:ln>
                   <a:noFill/>
                 </a:ln>
@@ -23601,7 +23156,7 @@
           <a:p>
             <a:pPr algn="ctr"/>
             <a:r>
-              <a:rPr lang="en-US" altLang="ja-JP" sz="1400" dirty="0" smtClean="0"/>
+              <a:rPr lang="en-US" altLang="ja-JP" sz="1400" dirty="0"/>
               <a:t>server</a:t>
             </a:r>
             <a:endParaRPr kumimoji="1" lang="ja-JP" altLang="en-US" sz="1400" dirty="0"/>
@@ -23677,13 +23232,6 @@
   <p:clrMapOvr>
     <a:masterClrMapping/>
   </p:clrMapOvr>
-  <p:timing>
-    <p:tnLst>
-      <p:par>
-        <p:cTn id="1" dur="indefinite" restart="never" nodeType="tmRoot"/>
-      </p:par>
-    </p:tnLst>
-  </p:timing>
 </p:sld>
 </file>
 

</xml_diff>